<commit_message>
Last Update 29-06-2019 10:19:46.74
</commit_message>
<xml_diff>
--- a/Presentations/Unit 1/CS8392-U1-10-ControlFlow_Decision.pptx
+++ b/Presentations/Unit 1/CS8392-U1-10-ControlFlow_Decision.pptx
@@ -5,7 +5,7 @@
     <p:sldMasterId id="2147483648" r:id="rId1"/>
   </p:sldMasterIdLst>
   <p:notesMasterIdLst>
-    <p:notesMasterId r:id="rId23"/>
+    <p:notesMasterId r:id="rId47"/>
   </p:notesMasterIdLst>
   <p:sldIdLst>
     <p:sldId id="256" r:id="rId2"/>
@@ -28,7 +28,31 @@
     <p:sldId id="289" r:id="rId19"/>
     <p:sldId id="290" r:id="rId20"/>
     <p:sldId id="291" r:id="rId21"/>
-    <p:sldId id="272" r:id="rId22"/>
+    <p:sldId id="292" r:id="rId22"/>
+    <p:sldId id="293" r:id="rId23"/>
+    <p:sldId id="294" r:id="rId24"/>
+    <p:sldId id="295" r:id="rId25"/>
+    <p:sldId id="296" r:id="rId26"/>
+    <p:sldId id="297" r:id="rId27"/>
+    <p:sldId id="298" r:id="rId28"/>
+    <p:sldId id="299" r:id="rId29"/>
+    <p:sldId id="300" r:id="rId30"/>
+    <p:sldId id="301" r:id="rId31"/>
+    <p:sldId id="302" r:id="rId32"/>
+    <p:sldId id="303" r:id="rId33"/>
+    <p:sldId id="304" r:id="rId34"/>
+    <p:sldId id="305" r:id="rId35"/>
+    <p:sldId id="306" r:id="rId36"/>
+    <p:sldId id="307" r:id="rId37"/>
+    <p:sldId id="308" r:id="rId38"/>
+    <p:sldId id="309" r:id="rId39"/>
+    <p:sldId id="310" r:id="rId40"/>
+    <p:sldId id="311" r:id="rId41"/>
+    <p:sldId id="312" r:id="rId42"/>
+    <p:sldId id="313" r:id="rId43"/>
+    <p:sldId id="314" r:id="rId44"/>
+    <p:sldId id="315" r:id="rId45"/>
+    <p:sldId id="272" r:id="rId46"/>
   </p:sldIdLst>
   <p:sldSz cx="9144000" cy="6858000" type="screen4x3"/>
   <p:notesSz cx="6858000" cy="9144000"/>
@@ -213,7 +237,7 @@
             <a:fld id="{9515075B-F3F0-4441-A1BD-B7B515B708FF}" type="datetimeFigureOut">
               <a:rPr lang="en-US" smtClean="0"/>
               <a:pPr/>
-              <a:t>7/17/2018</a:t>
+              <a:t>6/29/2019</a:t>
             </a:fld>
             <a:endParaRPr lang="en-US"/>
           </a:p>
@@ -750,7 +774,7 @@
             <a:fld id="{6E658DF8-B8C0-4C7F-85EB-B53A2DDD44A9}" type="datetimeFigureOut">
               <a:rPr lang="en-US" smtClean="0"/>
               <a:pPr/>
-              <a:t>7/17/2018</a:t>
+              <a:t>6/29/2019</a:t>
             </a:fld>
             <a:endParaRPr lang="en-US"/>
           </a:p>
@@ -917,7 +941,7 @@
             <a:fld id="{6E658DF8-B8C0-4C7F-85EB-B53A2DDD44A9}" type="datetimeFigureOut">
               <a:rPr lang="en-US" smtClean="0"/>
               <a:pPr/>
-              <a:t>7/17/2018</a:t>
+              <a:t>6/29/2019</a:t>
             </a:fld>
             <a:endParaRPr lang="en-US"/>
           </a:p>
@@ -1094,7 +1118,7 @@
             <a:fld id="{6E658DF8-B8C0-4C7F-85EB-B53A2DDD44A9}" type="datetimeFigureOut">
               <a:rPr lang="en-US" smtClean="0"/>
               <a:pPr/>
-              <a:t>7/17/2018</a:t>
+              <a:t>6/29/2019</a:t>
             </a:fld>
             <a:endParaRPr lang="en-US"/>
           </a:p>
@@ -1293,7 +1317,7 @@
             <a:fld id="{6E658DF8-B8C0-4C7F-85EB-B53A2DDD44A9}" type="datetimeFigureOut">
               <a:rPr lang="en-US" smtClean="0"/>
               <a:pPr/>
-              <a:t>7/17/2018</a:t>
+              <a:t>6/29/2019</a:t>
             </a:fld>
             <a:endParaRPr lang="en-US"/>
           </a:p>
@@ -1536,7 +1560,7 @@
             <a:fld id="{6E658DF8-B8C0-4C7F-85EB-B53A2DDD44A9}" type="datetimeFigureOut">
               <a:rPr lang="en-US" smtClean="0"/>
               <a:pPr/>
-              <a:t>7/17/2018</a:t>
+              <a:t>6/29/2019</a:t>
             </a:fld>
             <a:endParaRPr lang="en-US"/>
           </a:p>
@@ -1821,7 +1845,7 @@
             <a:fld id="{6E658DF8-B8C0-4C7F-85EB-B53A2DDD44A9}" type="datetimeFigureOut">
               <a:rPr lang="en-US" smtClean="0"/>
               <a:pPr/>
-              <a:t>7/17/2018</a:t>
+              <a:t>6/29/2019</a:t>
             </a:fld>
             <a:endParaRPr lang="en-US"/>
           </a:p>
@@ -2240,7 +2264,7 @@
             <a:fld id="{6E658DF8-B8C0-4C7F-85EB-B53A2DDD44A9}" type="datetimeFigureOut">
               <a:rPr lang="en-US" smtClean="0"/>
               <a:pPr/>
-              <a:t>7/17/2018</a:t>
+              <a:t>6/29/2019</a:t>
             </a:fld>
             <a:endParaRPr lang="en-US"/>
           </a:p>
@@ -2355,7 +2379,7 @@
             <a:fld id="{6E658DF8-B8C0-4C7F-85EB-B53A2DDD44A9}" type="datetimeFigureOut">
               <a:rPr lang="en-US" smtClean="0"/>
               <a:pPr/>
-              <a:t>7/17/2018</a:t>
+              <a:t>6/29/2019</a:t>
             </a:fld>
             <a:endParaRPr lang="en-US"/>
           </a:p>
@@ -2447,7 +2471,7 @@
             <a:fld id="{6E658DF8-B8C0-4C7F-85EB-B53A2DDD44A9}" type="datetimeFigureOut">
               <a:rPr lang="en-US" smtClean="0"/>
               <a:pPr/>
-              <a:t>7/17/2018</a:t>
+              <a:t>6/29/2019</a:t>
             </a:fld>
             <a:endParaRPr lang="en-US"/>
           </a:p>
@@ -2721,7 +2745,7 @@
             <a:fld id="{6E658DF8-B8C0-4C7F-85EB-B53A2DDD44A9}" type="datetimeFigureOut">
               <a:rPr lang="en-US" smtClean="0"/>
               <a:pPr/>
-              <a:t>7/17/2018</a:t>
+              <a:t>6/29/2019</a:t>
             </a:fld>
             <a:endParaRPr lang="en-US"/>
           </a:p>
@@ -2971,7 +2995,7 @@
             <a:fld id="{6E658DF8-B8C0-4C7F-85EB-B53A2DDD44A9}" type="datetimeFigureOut">
               <a:rPr lang="en-US" smtClean="0"/>
               <a:pPr/>
-              <a:t>7/17/2018</a:t>
+              <a:t>6/29/2019</a:t>
             </a:fld>
             <a:endParaRPr lang="en-US"/>
           </a:p>
@@ -3187,7 +3211,7 @@
             <a:fld id="{6E658DF8-B8C0-4C7F-85EB-B53A2DDD44A9}" type="datetimeFigureOut">
               <a:rPr lang="en-US" smtClean="0"/>
               <a:pPr/>
-              <a:t>7/17/2018</a:t>
+              <a:t>6/29/2019</a:t>
             </a:fld>
             <a:endParaRPr lang="en-US"/>
           </a:p>
@@ -3965,9 +3989,6 @@
               </a:rPr>
               <a:t> 1){</a:t>
             </a:r>
-            <a:endParaRPr lang="en-US" sz="3200" dirty="0" smtClean="0">
-              <a:latin typeface="Consolas" pitchFamily="49" charset="0"/>
-            </a:endParaRPr>
           </a:p>
           <a:p>
             <a:pPr>
@@ -4046,44 +4067,26 @@
               <a:rPr lang="en-US" sz="3200" dirty="0" smtClean="0">
                 <a:latin typeface="Consolas" pitchFamily="49" charset="0"/>
               </a:rPr>
-              <a:t>	</a:t>
-            </a:r>
+              <a:t>	}</a:t>
+            </a:r>
+          </a:p>
+          <a:p>
+            <a:pPr>
+              <a:buNone/>
+            </a:pPr>
             <a:r>
               <a:rPr lang="en-US" sz="3200" dirty="0" smtClean="0">
                 <a:latin typeface="Consolas" pitchFamily="49" charset="0"/>
               </a:rPr>
-              <a:t>}</a:t>
-            </a:r>
-          </a:p>
-          <a:p>
-            <a:pPr>
-              <a:buNone/>
-            </a:pPr>
+              <a:t>	else{</a:t>
+            </a:r>
+          </a:p>
+          <a:p>
             <a:r>
               <a:rPr lang="en-US" sz="3200" dirty="0" smtClean="0">
                 <a:latin typeface="Consolas" pitchFamily="49" charset="0"/>
               </a:rPr>
-              <a:t>	</a:t>
-            </a:r>
-            <a:r>
-              <a:rPr lang="en-US" sz="3200" dirty="0" smtClean="0">
-                <a:latin typeface="Consolas" pitchFamily="49" charset="0"/>
-              </a:rPr>
-              <a:t>else{</a:t>
-            </a:r>
-          </a:p>
-          <a:p>
-            <a:r>
-              <a:rPr lang="en-US" sz="3200" dirty="0" smtClean="0">
-                <a:latin typeface="Consolas" pitchFamily="49" charset="0"/>
-              </a:rPr>
-              <a:t>	</a:t>
-            </a:r>
-            <a:r>
-              <a:rPr lang="en-US" sz="3200" dirty="0" smtClean="0">
-                <a:latin typeface="Consolas" pitchFamily="49" charset="0"/>
-              </a:rPr>
-              <a:t>	</a:t>
+              <a:t>		</a:t>
             </a:r>
             <a:r>
               <a:rPr lang="en-US" sz="3200" dirty="0" smtClean="0">
@@ -4106,28 +4109,19 @@
               <a:rPr lang="en-US" sz="3200" dirty="0" smtClean="0">
                 <a:latin typeface="Consolas" pitchFamily="49" charset="0"/>
               </a:rPr>
-              <a:t>	</a:t>
-            </a:r>
+              <a:t>	}</a:t>
+            </a:r>
+          </a:p>
+          <a:p>
+            <a:pPr>
+              <a:buNone/>
+            </a:pPr>
             <a:r>
               <a:rPr lang="en-US" sz="3200" dirty="0" smtClean="0">
                 <a:latin typeface="Consolas" pitchFamily="49" charset="0"/>
               </a:rPr>
               <a:t>}</a:t>
             </a:r>
-          </a:p>
-          <a:p>
-            <a:pPr>
-              <a:buNone/>
-            </a:pPr>
-            <a:r>
-              <a:rPr lang="en-US" sz="3200" dirty="0" smtClean="0">
-                <a:latin typeface="Consolas" pitchFamily="49" charset="0"/>
-              </a:rPr>
-              <a:t>}</a:t>
-            </a:r>
-            <a:endParaRPr lang="en-US" sz="3200" dirty="0" smtClean="0">
-              <a:latin typeface="Consolas" pitchFamily="49" charset="0"/>
-            </a:endParaRPr>
           </a:p>
           <a:p>
             <a:pPr>
@@ -4969,13 +4963,8 @@
               <a:pPr algn="ctr"/>
               <a:r>
                 <a:rPr lang="en-US" dirty="0" smtClean="0"/>
-                <a:t>Statement </a:t>
+                <a:t>Statement default</a:t>
               </a:r>
-              <a:r>
-                <a:rPr lang="en-US" dirty="0" smtClean="0"/>
-                <a:t>default</a:t>
-              </a:r>
-              <a:endParaRPr lang="en-US" dirty="0" smtClean="0"/>
             </a:p>
           </p:txBody>
         </p:sp>
@@ -5612,7 +5601,6 @@
                 <a:rPr lang="en-US" b="1" dirty="0" smtClean="0"/>
                 <a:t>Unmatched</a:t>
               </a:r>
-              <a:endParaRPr lang="en-US" b="1" dirty="0" smtClean="0"/>
             </a:p>
           </p:txBody>
         </p:sp>
@@ -5654,7 +5642,6 @@
                 <a:rPr lang="en-US" b="1" dirty="0" smtClean="0"/>
                 <a:t>Unmatched</a:t>
               </a:r>
-              <a:endParaRPr lang="en-US" b="1" dirty="0" smtClean="0"/>
             </a:p>
           </p:txBody>
         </p:sp>
@@ -5696,7 +5683,6 @@
                 <a:rPr lang="en-US" b="1" dirty="0" smtClean="0"/>
                 <a:t>Matched</a:t>
               </a:r>
-              <a:endParaRPr lang="en-US" b="1" dirty="0" smtClean="0"/>
             </a:p>
           </p:txBody>
         </p:sp>
@@ -5738,7 +5724,6 @@
                 <a:rPr lang="en-US" b="1" dirty="0" smtClean="0"/>
                 <a:t>Matched</a:t>
               </a:r>
-              <a:endParaRPr lang="en-US" b="1" dirty="0" smtClean="0"/>
             </a:p>
           </p:txBody>
         </p:sp>
@@ -5780,7 +5765,6 @@
                 <a:rPr lang="en-US" b="1" dirty="0" smtClean="0"/>
                 <a:t>Matched</a:t>
               </a:r>
-              <a:endParaRPr lang="en-US" b="1" dirty="0" smtClean="0"/>
             </a:p>
           </p:txBody>
         </p:sp>
@@ -5846,7 +5830,7 @@
         <p:spPr/>
         <p:txBody>
           <a:bodyPr>
-            <a:normAutofit fontScale="77500" lnSpcReduction="20000"/>
+            <a:normAutofit fontScale="85000" lnSpcReduction="20000"/>
           </a:bodyPr>
           <a:lstStyle/>
           <a:p>
@@ -5868,12 +5852,9 @@
               </a:rPr>
               <a:t>(expression) { </a:t>
             </a:r>
-            <a:endParaRPr lang="en-IN" dirty="0" smtClean="0">
-              <a:latin typeface="Consolas" pitchFamily="49" charset="0"/>
-            </a:endParaRPr>
-          </a:p>
-          <a:p>
-            <a:pPr>
+          </a:p>
+          <a:p>
+            <a:pPr lvl="1">
               <a:buNone/>
             </a:pPr>
             <a:r>
@@ -5889,40 +5870,25 @@
               <a:rPr lang="en-IN" dirty="0" smtClean="0">
                 <a:latin typeface="Consolas" pitchFamily="49" charset="0"/>
               </a:rPr>
-              <a:t> </a:t>
-            </a:r>
-            <a:r>
-              <a:rPr lang="en-IN" dirty="0" smtClean="0">
+              <a:t> value : </a:t>
+            </a:r>
+          </a:p>
+          <a:p>
+            <a:pPr lvl="1">
+              <a:buNone/>
+            </a:pPr>
+            <a:r>
+              <a:rPr lang="en-IN" smtClean="0">
                 <a:latin typeface="Consolas" pitchFamily="49" charset="0"/>
               </a:rPr>
-              <a:t>value : </a:t>
+              <a:t>	//Statements </a:t>
             </a:r>
             <a:endParaRPr lang="en-IN" dirty="0" smtClean="0">
               <a:latin typeface="Consolas" pitchFamily="49" charset="0"/>
             </a:endParaRPr>
           </a:p>
           <a:p>
-            <a:pPr>
-              <a:buNone/>
-            </a:pPr>
-            <a:r>
-              <a:rPr lang="en-IN" dirty="0" smtClean="0">
-                <a:latin typeface="Consolas" pitchFamily="49" charset="0"/>
-              </a:rPr>
-              <a:t>// </a:t>
-            </a:r>
-            <a:r>
-              <a:rPr lang="en-IN" dirty="0" smtClean="0">
-                <a:latin typeface="Consolas" pitchFamily="49" charset="0"/>
-              </a:rPr>
-              <a:t>Statements </a:t>
-            </a:r>
-            <a:endParaRPr lang="en-IN" dirty="0" smtClean="0">
-              <a:latin typeface="Consolas" pitchFamily="49" charset="0"/>
-            </a:endParaRPr>
-          </a:p>
-          <a:p>
-            <a:pPr>
+            <a:pPr lvl="1">
               <a:buNone/>
             </a:pPr>
             <a:r>
@@ -5940,12 +5906,9 @@
               </a:rPr>
               <a:t>; </a:t>
             </a:r>
-            <a:endParaRPr lang="en-IN" dirty="0" smtClean="0">
-              <a:latin typeface="Consolas" pitchFamily="49" charset="0"/>
-            </a:endParaRPr>
-          </a:p>
-          <a:p>
-            <a:pPr>
+          </a:p>
+          <a:p>
+            <a:pPr lvl="1">
               <a:buNone/>
             </a:pPr>
             <a:r>
@@ -5961,40 +5924,22 @@
               <a:rPr lang="en-IN" dirty="0" smtClean="0">
                 <a:latin typeface="Consolas" pitchFamily="49" charset="0"/>
               </a:rPr>
-              <a:t> </a:t>
-            </a:r>
+              <a:t> value : </a:t>
+            </a:r>
+          </a:p>
+          <a:p>
+            <a:pPr lvl="1">
+              <a:buNone/>
+            </a:pPr>
             <a:r>
               <a:rPr lang="en-IN" dirty="0" smtClean="0">
                 <a:latin typeface="Consolas" pitchFamily="49" charset="0"/>
               </a:rPr>
-              <a:t>value : </a:t>
-            </a:r>
-            <a:endParaRPr lang="en-IN" dirty="0" smtClean="0">
-              <a:latin typeface="Consolas" pitchFamily="49" charset="0"/>
-            </a:endParaRPr>
-          </a:p>
-          <a:p>
-            <a:pPr>
-              <a:buNone/>
-            </a:pPr>
-            <a:r>
-              <a:rPr lang="en-IN" dirty="0" smtClean="0">
-                <a:latin typeface="Consolas" pitchFamily="49" charset="0"/>
-              </a:rPr>
-              <a:t>// </a:t>
-            </a:r>
-            <a:r>
-              <a:rPr lang="en-IN" dirty="0" smtClean="0">
-                <a:latin typeface="Consolas" pitchFamily="49" charset="0"/>
-              </a:rPr>
-              <a:t>Statements </a:t>
-            </a:r>
-            <a:endParaRPr lang="en-IN" dirty="0" smtClean="0">
-              <a:latin typeface="Consolas" pitchFamily="49" charset="0"/>
-            </a:endParaRPr>
-          </a:p>
-          <a:p>
-            <a:pPr>
+              <a:t>	//Statements </a:t>
+            </a:r>
+          </a:p>
+          <a:p>
+            <a:pPr lvl="1">
               <a:buNone/>
             </a:pPr>
             <a:r>
@@ -6012,12 +5957,9 @@
               </a:rPr>
               <a:t>; </a:t>
             </a:r>
-            <a:endParaRPr lang="en-IN" dirty="0" smtClean="0">
-              <a:latin typeface="Consolas" pitchFamily="49" charset="0"/>
-            </a:endParaRPr>
-          </a:p>
-          <a:p>
-            <a:pPr>
+          </a:p>
+          <a:p>
+            <a:pPr lvl="1">
               <a:buNone/>
             </a:pPr>
             <a:r>
@@ -6033,31 +5975,22 @@
               <a:rPr lang="en-IN" dirty="0" smtClean="0">
                 <a:latin typeface="Consolas" pitchFamily="49" charset="0"/>
               </a:rPr>
-              <a:t> </a:t>
-            </a:r>
+              <a:t> : </a:t>
+            </a:r>
+          </a:p>
+          <a:p>
+            <a:pPr lvl="1">
+              <a:buNone/>
+            </a:pPr>
             <a:r>
               <a:rPr lang="en-IN" dirty="0" smtClean="0">
                 <a:latin typeface="Consolas" pitchFamily="49" charset="0"/>
               </a:rPr>
-              <a:t>: </a:t>
-            </a:r>
-            <a:endParaRPr lang="en-IN" dirty="0" smtClean="0">
-              <a:latin typeface="Consolas" pitchFamily="49" charset="0"/>
-            </a:endParaRPr>
-          </a:p>
-          <a:p>
-            <a:pPr>
-              <a:buNone/>
-            </a:pPr>
-            <a:r>
-              <a:rPr lang="en-IN" dirty="0" smtClean="0">
-                <a:latin typeface="Consolas" pitchFamily="49" charset="0"/>
-              </a:rPr>
-              <a:t>//Statements </a:t>
-            </a:r>
-          </a:p>
-          <a:p>
-            <a:pPr>
+              <a:t>	//Statements </a:t>
+            </a:r>
+          </a:p>
+          <a:p>
+            <a:pPr lvl="1">
               <a:buNone/>
             </a:pPr>
             <a:r>
@@ -6067,16 +6000,7 @@
                 </a:solidFill>
                 <a:latin typeface="Consolas" pitchFamily="49" charset="0"/>
               </a:rPr>
-              <a:t>b</a:t>
-            </a:r>
-            <a:r>
-              <a:rPr lang="en-IN" dirty="0" smtClean="0">
-                <a:solidFill>
-                  <a:srgbClr val="FF0000"/>
-                </a:solidFill>
-                <a:latin typeface="Consolas" pitchFamily="49" charset="0"/>
-              </a:rPr>
-              <a:t>reak</a:t>
+              <a:t>break</a:t>
             </a:r>
             <a:r>
               <a:rPr lang="en-IN" dirty="0" smtClean="0">
@@ -6230,11 +6154,7 @@
           <a:p>
             <a:r>
               <a:rPr lang="en-US" dirty="0" smtClean="0"/>
-              <a:t>Example </a:t>
-            </a:r>
-            <a:r>
-              <a:rPr lang="en-US" dirty="0" smtClean="0"/>
-              <a:t>[Case 2]</a:t>
+              <a:t>Example [Case 2]</a:t>
             </a:r>
             <a:endParaRPr lang="en-US" dirty="0"/>
           </a:p>
@@ -6547,19 +6467,14 @@
             <p:ph type="title"/>
           </p:nvPr>
         </p:nvSpPr>
-        <p:spPr>
-          <a:xfrm>
-            <a:off x="457200" y="1981200"/>
-            <a:ext cx="8229600" cy="1143000"/>
-          </a:xfrm>
-        </p:spPr>
+        <p:spPr/>
         <p:txBody>
           <a:bodyPr/>
           <a:lstStyle/>
           <a:p>
             <a:r>
               <a:rPr lang="en-US" dirty="0" smtClean="0"/>
-              <a:t>Thank You</a:t>
+              <a:t>Loops</a:t>
             </a:r>
             <a:endParaRPr lang="en-US" dirty="0"/>
           </a:p>
@@ -6567,317 +6482,73 @@
       </p:sp>
       <p:sp>
         <p:nvSpPr>
-          <p:cNvPr id="4" name="Subtitle 2"/>
-          <p:cNvSpPr txBox="1">
-            <a:spLocks/>
-          </p:cNvSpPr>
-          <p:nvPr/>
-        </p:nvSpPr>
-        <p:spPr>
-          <a:xfrm>
-            <a:off x="4038600" y="4191000"/>
-            <a:ext cx="4191000" cy="1752600"/>
-          </a:xfrm>
-          <a:prstGeom prst="rect">
-            <a:avLst/>
-          </a:prstGeom>
-        </p:spPr>
-        <p:txBody>
-          <a:bodyPr vert="horz" lIns="91440" tIns="45720" rIns="91440" bIns="45720" rtlCol="0">
-            <a:normAutofit fontScale="92500" lnSpcReduction="10000"/>
+          <p:cNvPr id="3" name="Content Placeholder 2"/>
+          <p:cNvSpPr>
+            <a:spLocks noGrp="1"/>
+          </p:cNvSpPr>
+          <p:nvPr>
+            <p:ph idx="1"/>
+          </p:nvPr>
+        </p:nvSpPr>
+        <p:spPr/>
+        <p:txBody>
+          <a:bodyPr>
+            <a:normAutofit lnSpcReduction="10000"/>
           </a:bodyPr>
           <a:lstStyle/>
           <a:p>
-            <a:pPr marL="342900" marR="0" lvl="0" indent="-342900" algn="r" defTabSz="914400" rtl="0" eaLnBrk="1" fontAlgn="auto" latinLnBrk="0" hangingPunct="1">
-              <a:lnSpc>
-                <a:spcPct val="100000"/>
-              </a:lnSpc>
-              <a:spcBef>
-                <a:spcPct val="20000"/>
-              </a:spcBef>
-              <a:spcAft>
-                <a:spcPts val="0"/>
-              </a:spcAft>
-              <a:buClrTx/>
-              <a:buSzTx/>
-              <a:tabLst/>
-              <a:defRPr/>
-            </a:pPr>
-            <a:r>
-              <a:rPr kumimoji="0" lang="en-US" sz="2200" b="0" i="0" u="none" strike="noStrike" kern="1200" cap="none" spc="0" normalizeH="0" baseline="0" noProof="0" dirty="0" err="1" smtClean="0">
-                <a:ln>
-                  <a:noFill/>
-                </a:ln>
-                <a:solidFill>
-                  <a:schemeClr val="tx1"/>
-                </a:solidFill>
-                <a:effectLst/>
-                <a:uLnTx/>
-                <a:uFillTx/>
-                <a:latin typeface="Cambria" pitchFamily="18" charset="0"/>
-                <a:ea typeface="+mn-ea"/>
-                <a:cs typeface="+mn-cs"/>
-              </a:rPr>
-              <a:t>Rajasekaran</a:t>
-            </a:r>
-            <a:r>
-              <a:rPr kumimoji="0" lang="en-US" sz="2200" b="0" i="0" u="none" strike="noStrike" kern="1200" cap="none" spc="0" normalizeH="0" baseline="0" noProof="0" dirty="0" smtClean="0">
-                <a:ln>
-                  <a:noFill/>
-                </a:ln>
-                <a:solidFill>
-                  <a:schemeClr val="tx1"/>
-                </a:solidFill>
-                <a:effectLst/>
-                <a:uLnTx/>
-                <a:uFillTx/>
-                <a:latin typeface="Cambria" pitchFamily="18" charset="0"/>
-                <a:ea typeface="+mn-ea"/>
-                <a:cs typeface="+mn-cs"/>
-              </a:rPr>
-              <a:t> S</a:t>
-            </a:r>
-          </a:p>
-          <a:p>
-            <a:pPr marL="342900" marR="0" lvl="0" indent="-342900" algn="r" defTabSz="914400" rtl="0" eaLnBrk="1" fontAlgn="auto" latinLnBrk="0" hangingPunct="1">
-              <a:lnSpc>
-                <a:spcPct val="100000"/>
-              </a:lnSpc>
-              <a:spcBef>
-                <a:spcPct val="20000"/>
-              </a:spcBef>
-              <a:spcAft>
-                <a:spcPts val="0"/>
-              </a:spcAft>
-              <a:buClrTx/>
-              <a:buSzTx/>
-              <a:tabLst/>
-              <a:defRPr/>
-            </a:pPr>
-            <a:r>
-              <a:rPr kumimoji="0" lang="en-US" sz="1600" b="0" i="0" u="none" strike="noStrike" kern="1200" cap="none" spc="0" normalizeH="0" baseline="0" noProof="0" dirty="0" smtClean="0">
-                <a:ln>
-                  <a:noFill/>
-                </a:ln>
-                <a:solidFill>
-                  <a:schemeClr val="tx1"/>
-                </a:solidFill>
-                <a:effectLst/>
-                <a:uLnTx/>
-                <a:uFillTx/>
-                <a:latin typeface="Cambria" pitchFamily="18" charset="0"/>
-                <a:ea typeface="+mn-ea"/>
-                <a:cs typeface="+mn-cs"/>
-              </a:rPr>
-              <a:t>Assistant Professor,</a:t>
-            </a:r>
-          </a:p>
-          <a:p>
-            <a:pPr marL="342900" marR="0" lvl="0" indent="-342900" algn="r" defTabSz="914400" rtl="0" eaLnBrk="1" fontAlgn="auto" latinLnBrk="0" hangingPunct="1">
-              <a:lnSpc>
-                <a:spcPct val="100000"/>
-              </a:lnSpc>
-              <a:spcBef>
-                <a:spcPct val="20000"/>
-              </a:spcBef>
-              <a:spcAft>
-                <a:spcPts val="0"/>
-              </a:spcAft>
-              <a:buClrTx/>
-              <a:buSzTx/>
-              <a:tabLst/>
-              <a:defRPr/>
-            </a:pPr>
-            <a:r>
-              <a:rPr kumimoji="0" lang="en-US" sz="1600" b="0" i="0" u="none" strike="noStrike" kern="1200" cap="none" spc="0" normalizeH="0" baseline="0" noProof="0" dirty="0" smtClean="0">
-                <a:ln>
-                  <a:noFill/>
-                </a:ln>
-                <a:solidFill>
-                  <a:schemeClr val="tx1"/>
-                </a:solidFill>
-                <a:effectLst/>
-                <a:uLnTx/>
-                <a:uFillTx/>
-                <a:latin typeface="Cambria" pitchFamily="18" charset="0"/>
-                <a:ea typeface="+mn-ea"/>
-                <a:cs typeface="+mn-cs"/>
-              </a:rPr>
-              <a:t>Department of Information Technology,</a:t>
-            </a:r>
-          </a:p>
-          <a:p>
-            <a:pPr marL="342900" marR="0" lvl="0" indent="-342900" algn="r" defTabSz="914400" rtl="0" eaLnBrk="1" fontAlgn="auto" latinLnBrk="0" hangingPunct="1">
-              <a:lnSpc>
-                <a:spcPct val="100000"/>
-              </a:lnSpc>
-              <a:spcBef>
-                <a:spcPct val="20000"/>
-              </a:spcBef>
-              <a:spcAft>
-                <a:spcPts val="0"/>
-              </a:spcAft>
-              <a:buClrTx/>
-              <a:buSzTx/>
-              <a:tabLst/>
-              <a:defRPr/>
-            </a:pPr>
-            <a:r>
-              <a:rPr kumimoji="0" lang="en-US" sz="1600" b="0" i="0" u="none" strike="noStrike" kern="1200" cap="none" spc="0" normalizeH="0" baseline="0" noProof="0" dirty="0" err="1" smtClean="0">
-                <a:ln>
-                  <a:noFill/>
-                </a:ln>
-                <a:solidFill>
-                  <a:schemeClr val="tx1"/>
-                </a:solidFill>
-                <a:effectLst/>
-                <a:uLnTx/>
-                <a:uFillTx/>
-                <a:latin typeface="Cambria" pitchFamily="18" charset="0"/>
-                <a:ea typeface="+mn-ea"/>
-                <a:cs typeface="+mn-cs"/>
-              </a:rPr>
-              <a:t>KGiSL</a:t>
-            </a:r>
-            <a:r>
-              <a:rPr kumimoji="0" lang="en-US" sz="1600" b="0" i="0" u="none" strike="noStrike" kern="1200" cap="none" spc="0" normalizeH="0" baseline="0" noProof="0" dirty="0" smtClean="0">
-                <a:ln>
-                  <a:noFill/>
-                </a:ln>
-                <a:solidFill>
-                  <a:schemeClr val="tx1"/>
-                </a:solidFill>
-                <a:effectLst/>
-                <a:uLnTx/>
-                <a:uFillTx/>
-                <a:latin typeface="Cambria" pitchFamily="18" charset="0"/>
-                <a:ea typeface="+mn-ea"/>
-                <a:cs typeface="+mn-cs"/>
-              </a:rPr>
-              <a:t> Institute of Technology,</a:t>
-            </a:r>
-          </a:p>
-          <a:p>
-            <a:pPr marL="342900" marR="0" lvl="0" indent="-342900" algn="r" defTabSz="914400" rtl="0" eaLnBrk="1" fontAlgn="auto" latinLnBrk="0" hangingPunct="1">
-              <a:lnSpc>
-                <a:spcPct val="100000"/>
-              </a:lnSpc>
-              <a:spcBef>
-                <a:spcPct val="20000"/>
-              </a:spcBef>
-              <a:spcAft>
-                <a:spcPts val="0"/>
-              </a:spcAft>
-              <a:buClrTx/>
-              <a:buSzTx/>
-              <a:tabLst/>
-              <a:defRPr/>
-            </a:pPr>
-            <a:r>
-              <a:rPr kumimoji="0" lang="en-US" sz="1600" b="0" i="0" u="none" strike="noStrike" kern="1200" cap="none" spc="0" normalizeH="0" baseline="0" noProof="0" dirty="0" smtClean="0">
-                <a:ln>
-                  <a:noFill/>
-                </a:ln>
-                <a:solidFill>
-                  <a:schemeClr val="tx1"/>
-                </a:solidFill>
-                <a:effectLst/>
-                <a:uLnTx/>
-                <a:uFillTx/>
-                <a:latin typeface="Cambria" pitchFamily="18" charset="0"/>
-                <a:ea typeface="+mn-ea"/>
-                <a:cs typeface="+mn-cs"/>
-              </a:rPr>
-              <a:t>email: </a:t>
-            </a:r>
-            <a:r>
-              <a:rPr kumimoji="0" lang="en-US" sz="1600" b="0" i="0" u="none" strike="noStrike" kern="1200" cap="none" spc="0" normalizeH="0" baseline="0" noProof="0" dirty="0" smtClean="0">
-                <a:ln>
-                  <a:noFill/>
-                </a:ln>
-                <a:solidFill>
-                  <a:schemeClr val="tx1"/>
-                </a:solidFill>
-                <a:effectLst/>
-                <a:uLnTx/>
-                <a:uFillTx/>
-                <a:latin typeface="Cambria" pitchFamily="18" charset="0"/>
-                <a:ea typeface="+mn-ea"/>
-                <a:cs typeface="+mn-cs"/>
-                <a:hlinkClick r:id="rId2"/>
-              </a:rPr>
-              <a:t>proffraja@gmail.com</a:t>
-            </a:r>
-            <a:endParaRPr lang="en-US" sz="1600" dirty="0" smtClean="0">
-              <a:latin typeface="Cambria" pitchFamily="18" charset="0"/>
-            </a:endParaRPr>
-          </a:p>
-          <a:p>
-            <a:pPr marL="342900" marR="0" lvl="0" indent="-342900" algn="r" defTabSz="914400" rtl="0" eaLnBrk="1" fontAlgn="auto" latinLnBrk="0" hangingPunct="1">
-              <a:lnSpc>
-                <a:spcPct val="100000"/>
-              </a:lnSpc>
-              <a:spcBef>
-                <a:spcPct val="20000"/>
-              </a:spcBef>
-              <a:spcAft>
-                <a:spcPts val="0"/>
-              </a:spcAft>
-              <a:buClrTx/>
-              <a:buSzTx/>
-              <a:tabLst/>
-              <a:defRPr/>
-            </a:pPr>
-            <a:r>
-              <a:rPr lang="en-US" sz="1600" dirty="0" err="1" smtClean="0">
-                <a:latin typeface="Cambria" pitchFamily="18" charset="0"/>
-              </a:rPr>
-              <a:t>Github:</a:t>
-            </a:r>
-            <a:r>
-              <a:rPr lang="en-US" sz="1600" dirty="0" err="1" smtClean="0">
-                <a:latin typeface="Cambria" pitchFamily="18" charset="0"/>
-                <a:hlinkClick r:id="rId3"/>
-              </a:rPr>
-              <a:t>www.github.com</a:t>
-            </a:r>
-            <a:r>
-              <a:rPr lang="en-US" sz="1600" dirty="0" smtClean="0">
-                <a:latin typeface="Cambria" pitchFamily="18" charset="0"/>
-                <a:hlinkClick r:id="rId3"/>
-              </a:rPr>
-              <a:t>/</a:t>
-            </a:r>
-            <a:r>
-              <a:rPr lang="en-US" sz="1600" dirty="0" err="1" smtClean="0">
-                <a:latin typeface="Cambria" pitchFamily="18" charset="0"/>
-                <a:hlinkClick r:id="rId3"/>
-              </a:rPr>
-              <a:t>rajasekaranap</a:t>
-            </a:r>
-            <a:endParaRPr lang="en-US" sz="1600" dirty="0" smtClean="0">
-              <a:latin typeface="Cambria" pitchFamily="18" charset="0"/>
-            </a:endParaRPr>
-          </a:p>
-          <a:p>
-            <a:pPr marL="342900" marR="0" lvl="0" indent="-342900" algn="r" defTabSz="914400" rtl="0" eaLnBrk="1" fontAlgn="auto" latinLnBrk="0" hangingPunct="1">
-              <a:lnSpc>
-                <a:spcPct val="100000"/>
-              </a:lnSpc>
-              <a:spcBef>
-                <a:spcPct val="20000"/>
-              </a:spcBef>
-              <a:spcAft>
-                <a:spcPts val="0"/>
-              </a:spcAft>
-              <a:buClrTx/>
-              <a:buSzTx/>
-              <a:tabLst/>
-              <a:defRPr/>
-            </a:pPr>
-            <a:endParaRPr lang="en-US" sz="1600" dirty="0" smtClean="0">
-              <a:latin typeface="Cambria" pitchFamily="18" charset="0"/>
-            </a:endParaRPr>
+            <a:r>
+              <a:rPr lang="en-US" dirty="0" smtClean="0"/>
+              <a:t>It is also known as iterate statements.</a:t>
+            </a:r>
+          </a:p>
+          <a:p>
+            <a:r>
+              <a:rPr lang="en-US" dirty="0" smtClean="0"/>
+              <a:t>A block of code is repeatedly executed until some condition is satisfied or true.</a:t>
+            </a:r>
+          </a:p>
+          <a:p>
+            <a:r>
+              <a:rPr lang="en-US" dirty="0" smtClean="0"/>
+              <a:t> There are 2 types of loops</a:t>
+            </a:r>
+          </a:p>
+          <a:p>
+            <a:pPr lvl="1"/>
+            <a:r>
+              <a:rPr lang="en-US" dirty="0" smtClean="0"/>
+              <a:t>Deterministic Loop</a:t>
+            </a:r>
+          </a:p>
+          <a:p>
+            <a:pPr lvl="2"/>
+            <a:r>
+              <a:rPr lang="en-US" dirty="0" smtClean="0"/>
+              <a:t>for loop</a:t>
+            </a:r>
+          </a:p>
+          <a:p>
+            <a:pPr lvl="1"/>
+            <a:r>
+              <a:rPr lang="en-US" dirty="0" smtClean="0"/>
+              <a:t>Non Deterministic Loops</a:t>
+            </a:r>
+          </a:p>
+          <a:p>
+            <a:pPr lvl="2"/>
+            <a:r>
+              <a:rPr lang="en-US" dirty="0" smtClean="0"/>
+              <a:t>while</a:t>
+            </a:r>
+          </a:p>
+          <a:p>
+            <a:pPr lvl="2"/>
+            <a:r>
+              <a:rPr lang="en-US" dirty="0" smtClean="0"/>
+              <a:t>do-while </a:t>
+            </a:r>
+            <a:endParaRPr lang="en-US" dirty="0"/>
           </a:p>
         </p:txBody>
       </p:sp>
@@ -6893,6 +6564,933 @@
       </p:par>
     </p:tnLst>
   </p:timing>
+</p:sld>
+</file>
+
+<file path=ppt/slides/slide22.xml><?xml version="1.0" encoding="utf-8"?>
+<p:sld xmlns:a="http://schemas.openxmlformats.org/drawingml/2006/main" xmlns:r="http://schemas.openxmlformats.org/officeDocument/2006/relationships" xmlns:p="http://schemas.openxmlformats.org/presentationml/2006/main">
+  <p:cSld>
+    <p:spTree>
+      <p:nvGrpSpPr>
+        <p:cNvPr id="1" name=""/>
+        <p:cNvGrpSpPr/>
+        <p:nvPr/>
+      </p:nvGrpSpPr>
+      <p:grpSpPr>
+        <a:xfrm>
+          <a:off x="0" y="0"/>
+          <a:ext cx="0" cy="0"/>
+          <a:chOff x="0" y="0"/>
+          <a:chExt cx="0" cy="0"/>
+        </a:xfrm>
+      </p:grpSpPr>
+      <p:sp>
+        <p:nvSpPr>
+          <p:cNvPr id="2" name="Title 1"/>
+          <p:cNvSpPr>
+            <a:spLocks noGrp="1"/>
+          </p:cNvSpPr>
+          <p:nvPr>
+            <p:ph type="title"/>
+          </p:nvPr>
+        </p:nvSpPr>
+        <p:spPr/>
+        <p:txBody>
+          <a:bodyPr/>
+          <a:lstStyle/>
+          <a:p>
+            <a:r>
+              <a:rPr lang="en-US" dirty="0" smtClean="0"/>
+              <a:t>FOR LOOP</a:t>
+            </a:r>
+            <a:endParaRPr lang="en-US" dirty="0"/>
+          </a:p>
+        </p:txBody>
+      </p:sp>
+      <p:sp>
+        <p:nvSpPr>
+          <p:cNvPr id="3" name="Content Placeholder 2"/>
+          <p:cNvSpPr>
+            <a:spLocks noGrp="1"/>
+          </p:cNvSpPr>
+          <p:nvPr>
+            <p:ph idx="1"/>
+          </p:nvPr>
+        </p:nvSpPr>
+        <p:spPr/>
+        <p:txBody>
+          <a:bodyPr>
+            <a:normAutofit fontScale="92500"/>
+          </a:bodyPr>
+          <a:lstStyle/>
+          <a:p>
+            <a:r>
+              <a:rPr lang="en-US" dirty="0" smtClean="0"/>
+              <a:t>For loop is also known as deterministic loop.</a:t>
+            </a:r>
+          </a:p>
+          <a:p>
+            <a:r>
+              <a:rPr lang="en-US" dirty="0" smtClean="0"/>
+              <a:t>The loop contains</a:t>
+            </a:r>
+          </a:p>
+          <a:p>
+            <a:pPr lvl="1"/>
+            <a:r>
+              <a:rPr lang="en-US" dirty="0" smtClean="0"/>
+              <a:t>Initialization</a:t>
+            </a:r>
+          </a:p>
+          <a:p>
+            <a:pPr lvl="1"/>
+            <a:r>
+              <a:rPr lang="en-US" dirty="0" smtClean="0"/>
+              <a:t>Condition</a:t>
+            </a:r>
+          </a:p>
+          <a:p>
+            <a:pPr lvl="1"/>
+            <a:r>
+              <a:rPr lang="en-US" dirty="0" smtClean="0"/>
+              <a:t>Increment/Decrement</a:t>
+            </a:r>
+          </a:p>
+          <a:p>
+            <a:r>
+              <a:rPr lang="en-US" dirty="0" smtClean="0"/>
+              <a:t>Using this we can clearly determine</a:t>
+            </a:r>
+          </a:p>
+          <a:p>
+            <a:pPr lvl="1"/>
+            <a:r>
+              <a:rPr lang="en-US" dirty="0" smtClean="0"/>
+              <a:t>String of loop.</a:t>
+            </a:r>
+          </a:p>
+          <a:p>
+            <a:pPr lvl="1"/>
+            <a:r>
+              <a:rPr lang="en-US" dirty="0" smtClean="0"/>
+              <a:t>When it will end</a:t>
+            </a:r>
+          </a:p>
+          <a:p>
+            <a:pPr lvl="1"/>
+            <a:r>
+              <a:rPr lang="en-US" dirty="0" smtClean="0"/>
+              <a:t>How many iteration may run </a:t>
+            </a:r>
+            <a:endParaRPr lang="en-US" dirty="0"/>
+          </a:p>
+        </p:txBody>
+      </p:sp>
+    </p:spTree>
+  </p:cSld>
+  <p:clrMapOvr>
+    <a:masterClrMapping/>
+  </p:clrMapOvr>
+  <p:timing>
+    <p:tnLst>
+      <p:par>
+        <p:cTn id="1" dur="indefinite" restart="never" nodeType="tmRoot"/>
+      </p:par>
+    </p:tnLst>
+  </p:timing>
+</p:sld>
+</file>
+
+<file path=ppt/slides/slide23.xml><?xml version="1.0" encoding="utf-8"?>
+<p:sld xmlns:a="http://schemas.openxmlformats.org/drawingml/2006/main" xmlns:r="http://schemas.openxmlformats.org/officeDocument/2006/relationships" xmlns:p="http://schemas.openxmlformats.org/presentationml/2006/main">
+  <p:cSld>
+    <p:spTree>
+      <p:nvGrpSpPr>
+        <p:cNvPr id="1" name=""/>
+        <p:cNvGrpSpPr/>
+        <p:nvPr/>
+      </p:nvGrpSpPr>
+      <p:grpSpPr>
+        <a:xfrm>
+          <a:off x="0" y="0"/>
+          <a:ext cx="0" cy="0"/>
+          <a:chOff x="0" y="0"/>
+          <a:chExt cx="0" cy="0"/>
+        </a:xfrm>
+      </p:grpSpPr>
+      <p:sp>
+        <p:nvSpPr>
+          <p:cNvPr id="2" name="Title 1"/>
+          <p:cNvSpPr>
+            <a:spLocks noGrp="1"/>
+          </p:cNvSpPr>
+          <p:nvPr>
+            <p:ph type="title"/>
+          </p:nvPr>
+        </p:nvSpPr>
+        <p:spPr/>
+        <p:txBody>
+          <a:bodyPr/>
+          <a:lstStyle/>
+          <a:p>
+            <a:r>
+              <a:rPr lang="en-US" dirty="0" smtClean="0"/>
+              <a:t>Syntax</a:t>
+            </a:r>
+            <a:endParaRPr lang="en-US" dirty="0"/>
+          </a:p>
+        </p:txBody>
+      </p:sp>
+      <p:sp>
+        <p:nvSpPr>
+          <p:cNvPr id="3" name="Content Placeholder 2"/>
+          <p:cNvSpPr>
+            <a:spLocks noGrp="1"/>
+          </p:cNvSpPr>
+          <p:nvPr>
+            <p:ph idx="1"/>
+          </p:nvPr>
+        </p:nvSpPr>
+        <p:spPr>
+          <a:xfrm>
+            <a:off x="457200" y="1600201"/>
+            <a:ext cx="8229600" cy="2133600"/>
+          </a:xfrm>
+        </p:spPr>
+        <p:txBody>
+          <a:bodyPr>
+            <a:normAutofit/>
+          </a:bodyPr>
+          <a:lstStyle/>
+          <a:p>
+            <a:pPr marL="342900" lvl="1" indent="-342900">
+              <a:buNone/>
+            </a:pPr>
+            <a:r>
+              <a:rPr lang="en-US" sz="2200" dirty="0" smtClean="0">
+                <a:latin typeface="Consolas" pitchFamily="49" charset="0"/>
+              </a:rPr>
+              <a:t>for(Initialization; Condition; Increment/Decrement)</a:t>
+            </a:r>
+          </a:p>
+          <a:p>
+            <a:pPr marL="342900" lvl="1" indent="-342900">
+              <a:buNone/>
+            </a:pPr>
+            <a:r>
+              <a:rPr lang="en-US" sz="2200" dirty="0" smtClean="0">
+                <a:latin typeface="Consolas" pitchFamily="49" charset="0"/>
+              </a:rPr>
+              <a:t>{</a:t>
+            </a:r>
+          </a:p>
+          <a:p>
+            <a:pPr>
+              <a:buNone/>
+            </a:pPr>
+            <a:r>
+              <a:rPr lang="en-US" sz="2200" dirty="0" smtClean="0">
+                <a:latin typeface="Consolas" pitchFamily="49" charset="0"/>
+              </a:rPr>
+              <a:t>	// Statements of for loop	</a:t>
+            </a:r>
+          </a:p>
+          <a:p>
+            <a:pPr>
+              <a:buNone/>
+            </a:pPr>
+            <a:r>
+              <a:rPr lang="en-US" sz="2200" dirty="0" smtClean="0">
+                <a:latin typeface="Consolas" pitchFamily="49" charset="0"/>
+              </a:rPr>
+              <a:t>}</a:t>
+            </a:r>
+            <a:endParaRPr lang="en-US" sz="2200" dirty="0">
+              <a:latin typeface="Consolas" pitchFamily="49" charset="0"/>
+            </a:endParaRPr>
+          </a:p>
+        </p:txBody>
+      </p:sp>
+    </p:spTree>
+  </p:cSld>
+  <p:clrMapOvr>
+    <a:masterClrMapping/>
+  </p:clrMapOvr>
+  <p:timing>
+    <p:tnLst>
+      <p:par>
+        <p:cTn id="1" dur="indefinite" restart="never" nodeType="tmRoot"/>
+      </p:par>
+    </p:tnLst>
+  </p:timing>
+</p:sld>
+</file>
+
+<file path=ppt/slides/slide24.xml><?xml version="1.0" encoding="utf-8"?>
+<p:sld xmlns:a="http://schemas.openxmlformats.org/drawingml/2006/main" xmlns:r="http://schemas.openxmlformats.org/officeDocument/2006/relationships" xmlns:p="http://schemas.openxmlformats.org/presentationml/2006/main">
+  <p:cSld>
+    <p:spTree>
+      <p:nvGrpSpPr>
+        <p:cNvPr id="1" name=""/>
+        <p:cNvGrpSpPr/>
+        <p:nvPr/>
+      </p:nvGrpSpPr>
+      <p:grpSpPr>
+        <a:xfrm>
+          <a:off x="0" y="0"/>
+          <a:ext cx="0" cy="0"/>
+          <a:chOff x="0" y="0"/>
+          <a:chExt cx="0" cy="0"/>
+        </a:xfrm>
+      </p:grpSpPr>
+      <p:sp>
+        <p:nvSpPr>
+          <p:cNvPr id="2" name="Title 1"/>
+          <p:cNvSpPr>
+            <a:spLocks noGrp="1"/>
+          </p:cNvSpPr>
+          <p:nvPr>
+            <p:ph type="title"/>
+          </p:nvPr>
+        </p:nvSpPr>
+        <p:spPr/>
+        <p:txBody>
+          <a:bodyPr/>
+          <a:lstStyle/>
+          <a:p>
+            <a:r>
+              <a:rPr lang="en-US" dirty="0" smtClean="0"/>
+              <a:t>Example [Print 0 to 9]</a:t>
+            </a:r>
+            <a:endParaRPr lang="en-US" dirty="0"/>
+          </a:p>
+        </p:txBody>
+      </p:sp>
+      <p:pic>
+        <p:nvPicPr>
+          <p:cNvPr id="1026" name="Picture 2"/>
+          <p:cNvPicPr>
+            <a:picLocks noChangeAspect="1" noChangeArrowheads="1"/>
+          </p:cNvPicPr>
+          <p:nvPr/>
+        </p:nvPicPr>
+        <p:blipFill>
+          <a:blip r:embed="rId2" cstate="print"/>
+          <a:srcRect/>
+          <a:stretch>
+            <a:fillRect/>
+          </a:stretch>
+        </p:blipFill>
+        <p:spPr bwMode="auto">
+          <a:xfrm>
+            <a:off x="457200" y="1600201"/>
+            <a:ext cx="8153400" cy="4800600"/>
+          </a:xfrm>
+          <a:prstGeom prst="rect">
+            <a:avLst/>
+          </a:prstGeom>
+          <a:noFill/>
+          <a:ln w="9525">
+            <a:noFill/>
+            <a:miter lim="800000"/>
+            <a:headEnd/>
+            <a:tailEnd/>
+          </a:ln>
+        </p:spPr>
+      </p:pic>
+    </p:spTree>
+  </p:cSld>
+  <p:clrMapOvr>
+    <a:masterClrMapping/>
+  </p:clrMapOvr>
+  <p:timing>
+    <p:tnLst>
+      <p:par>
+        <p:cTn id="1" dur="indefinite" restart="never" nodeType="tmRoot"/>
+      </p:par>
+    </p:tnLst>
+  </p:timing>
+</p:sld>
+</file>
+
+<file path=ppt/slides/slide25.xml><?xml version="1.0" encoding="utf-8"?>
+<p:sld xmlns:a="http://schemas.openxmlformats.org/drawingml/2006/main" xmlns:r="http://schemas.openxmlformats.org/officeDocument/2006/relationships" xmlns:p="http://schemas.openxmlformats.org/presentationml/2006/main">
+  <p:cSld>
+    <p:spTree>
+      <p:nvGrpSpPr>
+        <p:cNvPr id="1" name=""/>
+        <p:cNvGrpSpPr/>
+        <p:nvPr/>
+      </p:nvGrpSpPr>
+      <p:grpSpPr>
+        <a:xfrm>
+          <a:off x="0" y="0"/>
+          <a:ext cx="0" cy="0"/>
+          <a:chOff x="0" y="0"/>
+          <a:chExt cx="0" cy="0"/>
+        </a:xfrm>
+      </p:grpSpPr>
+      <p:sp>
+        <p:nvSpPr>
+          <p:cNvPr id="2" name="Title 1"/>
+          <p:cNvSpPr>
+            <a:spLocks noGrp="1"/>
+          </p:cNvSpPr>
+          <p:nvPr>
+            <p:ph type="title"/>
+          </p:nvPr>
+        </p:nvSpPr>
+        <p:spPr/>
+        <p:txBody>
+          <a:bodyPr>
+            <a:normAutofit fontScale="90000"/>
+          </a:bodyPr>
+          <a:lstStyle/>
+          <a:p>
+            <a:r>
+              <a:rPr lang="en-US" dirty="0" smtClean="0"/>
+              <a:t>For with if [Printing Even Number]</a:t>
+            </a:r>
+            <a:endParaRPr lang="en-US" dirty="0"/>
+          </a:p>
+        </p:txBody>
+      </p:sp>
+      <p:pic>
+        <p:nvPicPr>
+          <p:cNvPr id="2050" name="Picture 2"/>
+          <p:cNvPicPr>
+            <a:picLocks noChangeAspect="1" noChangeArrowheads="1"/>
+          </p:cNvPicPr>
+          <p:nvPr/>
+        </p:nvPicPr>
+        <p:blipFill>
+          <a:blip r:embed="rId2" cstate="print"/>
+          <a:srcRect/>
+          <a:stretch>
+            <a:fillRect/>
+          </a:stretch>
+        </p:blipFill>
+        <p:spPr bwMode="auto">
+          <a:xfrm>
+            <a:off x="1066800" y="1676400"/>
+            <a:ext cx="6629400" cy="4776537"/>
+          </a:xfrm>
+          <a:prstGeom prst="rect">
+            <a:avLst/>
+          </a:prstGeom>
+          <a:noFill/>
+          <a:ln w="9525">
+            <a:noFill/>
+            <a:miter lim="800000"/>
+            <a:headEnd/>
+            <a:tailEnd/>
+          </a:ln>
+        </p:spPr>
+      </p:pic>
+    </p:spTree>
+  </p:cSld>
+  <p:clrMapOvr>
+    <a:masterClrMapping/>
+  </p:clrMapOvr>
+  <p:timing>
+    <p:tnLst>
+      <p:par>
+        <p:cTn id="1" dur="indefinite" restart="never" nodeType="tmRoot"/>
+      </p:par>
+    </p:tnLst>
+  </p:timing>
+</p:sld>
+</file>
+
+<file path=ppt/slides/slide26.xml><?xml version="1.0" encoding="utf-8"?>
+<p:sld xmlns:a="http://schemas.openxmlformats.org/drawingml/2006/main" xmlns:r="http://schemas.openxmlformats.org/officeDocument/2006/relationships" xmlns:p="http://schemas.openxmlformats.org/presentationml/2006/main">
+  <p:cSld>
+    <p:spTree>
+      <p:nvGrpSpPr>
+        <p:cNvPr id="1" name=""/>
+        <p:cNvGrpSpPr/>
+        <p:nvPr/>
+      </p:nvGrpSpPr>
+      <p:grpSpPr>
+        <a:xfrm>
+          <a:off x="0" y="0"/>
+          <a:ext cx="0" cy="0"/>
+          <a:chOff x="0" y="0"/>
+          <a:chExt cx="0" cy="0"/>
+        </a:xfrm>
+      </p:grpSpPr>
+      <p:sp>
+        <p:nvSpPr>
+          <p:cNvPr id="2" name="Title 1"/>
+          <p:cNvSpPr>
+            <a:spLocks noGrp="1"/>
+          </p:cNvSpPr>
+          <p:nvPr>
+            <p:ph type="title"/>
+          </p:nvPr>
+        </p:nvSpPr>
+        <p:spPr/>
+        <p:txBody>
+          <a:bodyPr/>
+          <a:lstStyle/>
+          <a:p>
+            <a:r>
+              <a:rPr lang="en-US" dirty="0" smtClean="0"/>
+              <a:t>WHILE LOOP</a:t>
+            </a:r>
+            <a:endParaRPr lang="en-US" dirty="0"/>
+          </a:p>
+        </p:txBody>
+      </p:sp>
+      <p:sp>
+        <p:nvSpPr>
+          <p:cNvPr id="3" name="Content Placeholder 2"/>
+          <p:cNvSpPr>
+            <a:spLocks noGrp="1"/>
+          </p:cNvSpPr>
+          <p:nvPr>
+            <p:ph idx="1"/>
+          </p:nvPr>
+        </p:nvSpPr>
+        <p:spPr/>
+        <p:txBody>
+          <a:bodyPr>
+            <a:normAutofit fontScale="92500" lnSpcReduction="10000"/>
+          </a:bodyPr>
+          <a:lstStyle/>
+          <a:p>
+            <a:r>
+              <a:rPr lang="en-US" dirty="0" smtClean="0"/>
+              <a:t>It is a type of non deterministic loop.</a:t>
+            </a:r>
+          </a:p>
+          <a:p>
+            <a:r>
+              <a:rPr lang="en-US" dirty="0" smtClean="0"/>
+              <a:t>It check’s the condition before entering into the loop.</a:t>
+            </a:r>
+          </a:p>
+          <a:p>
+            <a:r>
+              <a:rPr lang="en-US" dirty="0" smtClean="0"/>
+              <a:t>The block of statement repeatedly execute until the condition remains satisfied.</a:t>
+            </a:r>
+          </a:p>
+          <a:p>
+            <a:r>
+              <a:rPr lang="en-US" dirty="0" smtClean="0"/>
+              <a:t>It is also known as entry control loop.</a:t>
+            </a:r>
+          </a:p>
+          <a:p>
+            <a:r>
+              <a:rPr lang="en-US" dirty="0" smtClean="0"/>
+              <a:t>The condition may or may not satisfied.</a:t>
+            </a:r>
+          </a:p>
+          <a:p>
+            <a:r>
+              <a:rPr lang="en-US" dirty="0" smtClean="0"/>
+              <a:t>We are not sure about the termination of loop and no of iterations. </a:t>
+            </a:r>
+            <a:endParaRPr lang="en-US" dirty="0"/>
+          </a:p>
+        </p:txBody>
+      </p:sp>
+    </p:spTree>
+  </p:cSld>
+  <p:clrMapOvr>
+    <a:masterClrMapping/>
+  </p:clrMapOvr>
+  <p:timing>
+    <p:tnLst>
+      <p:par>
+        <p:cTn id="1" dur="indefinite" restart="never" nodeType="tmRoot"/>
+      </p:par>
+    </p:tnLst>
+  </p:timing>
+</p:sld>
+</file>
+
+<file path=ppt/slides/slide27.xml><?xml version="1.0" encoding="utf-8"?>
+<p:sld xmlns:a="http://schemas.openxmlformats.org/drawingml/2006/main" xmlns:r="http://schemas.openxmlformats.org/officeDocument/2006/relationships" xmlns:p="http://schemas.openxmlformats.org/presentationml/2006/main">
+  <p:cSld>
+    <p:spTree>
+      <p:nvGrpSpPr>
+        <p:cNvPr id="1" name=""/>
+        <p:cNvGrpSpPr/>
+        <p:nvPr/>
+      </p:nvGrpSpPr>
+      <p:grpSpPr>
+        <a:xfrm>
+          <a:off x="0" y="0"/>
+          <a:ext cx="0" cy="0"/>
+          <a:chOff x="0" y="0"/>
+          <a:chExt cx="0" cy="0"/>
+        </a:xfrm>
+      </p:grpSpPr>
+      <p:sp>
+        <p:nvSpPr>
+          <p:cNvPr id="2" name="Title 1"/>
+          <p:cNvSpPr>
+            <a:spLocks noGrp="1"/>
+          </p:cNvSpPr>
+          <p:nvPr>
+            <p:ph type="title"/>
+          </p:nvPr>
+        </p:nvSpPr>
+        <p:spPr/>
+        <p:txBody>
+          <a:bodyPr/>
+          <a:lstStyle/>
+          <a:p>
+            <a:r>
+              <a:rPr lang="en-US" dirty="0" smtClean="0"/>
+              <a:t>Syntax</a:t>
+            </a:r>
+            <a:endParaRPr lang="en-US" dirty="0"/>
+          </a:p>
+        </p:txBody>
+      </p:sp>
+      <p:sp>
+        <p:nvSpPr>
+          <p:cNvPr id="3" name="Content Placeholder 2"/>
+          <p:cNvSpPr>
+            <a:spLocks noGrp="1"/>
+          </p:cNvSpPr>
+          <p:nvPr>
+            <p:ph idx="1"/>
+          </p:nvPr>
+        </p:nvSpPr>
+        <p:spPr/>
+        <p:txBody>
+          <a:bodyPr/>
+          <a:lstStyle/>
+          <a:p>
+            <a:pPr>
+              <a:buNone/>
+            </a:pPr>
+            <a:r>
+              <a:rPr lang="en-US" dirty="0" smtClean="0">
+                <a:solidFill>
+                  <a:srgbClr val="FF0000"/>
+                </a:solidFill>
+                <a:latin typeface="Consolas" pitchFamily="49" charset="0"/>
+              </a:rPr>
+              <a:t>while</a:t>
+            </a:r>
+            <a:r>
+              <a:rPr lang="en-US" dirty="0" smtClean="0">
+                <a:latin typeface="Consolas" pitchFamily="49" charset="0"/>
+              </a:rPr>
+              <a:t>(Condition){</a:t>
+            </a:r>
+          </a:p>
+          <a:p>
+            <a:pPr>
+              <a:buNone/>
+            </a:pPr>
+            <a:r>
+              <a:rPr lang="en-US" dirty="0" smtClean="0">
+                <a:latin typeface="Consolas" pitchFamily="49" charset="0"/>
+              </a:rPr>
+              <a:t>…</a:t>
+            </a:r>
+          </a:p>
+          <a:p>
+            <a:pPr>
+              <a:buNone/>
+            </a:pPr>
+            <a:r>
+              <a:rPr lang="en-US" dirty="0" smtClean="0">
+                <a:latin typeface="Consolas" pitchFamily="49" charset="0"/>
+              </a:rPr>
+              <a:t>// Block of while loop</a:t>
+            </a:r>
+          </a:p>
+          <a:p>
+            <a:pPr>
+              <a:buNone/>
+            </a:pPr>
+            <a:r>
+              <a:rPr lang="en-US" dirty="0" smtClean="0">
+                <a:latin typeface="Consolas" pitchFamily="49" charset="0"/>
+              </a:rPr>
+              <a:t>…</a:t>
+            </a:r>
+          </a:p>
+          <a:p>
+            <a:pPr>
+              <a:buNone/>
+            </a:pPr>
+            <a:r>
+              <a:rPr lang="en-US" dirty="0" smtClean="0">
+                <a:latin typeface="Consolas" pitchFamily="49" charset="0"/>
+              </a:rPr>
+              <a:t>}</a:t>
+            </a:r>
+          </a:p>
+        </p:txBody>
+      </p:sp>
+    </p:spTree>
+  </p:cSld>
+  <p:clrMapOvr>
+    <a:masterClrMapping/>
+  </p:clrMapOvr>
+  <p:timing>
+    <p:tnLst>
+      <p:par>
+        <p:cTn id="1" dur="indefinite" restart="never" nodeType="tmRoot"/>
+      </p:par>
+    </p:tnLst>
+  </p:timing>
+</p:sld>
+</file>
+
+<file path=ppt/slides/slide28.xml><?xml version="1.0" encoding="utf-8"?>
+<p:sld xmlns:a="http://schemas.openxmlformats.org/drawingml/2006/main" xmlns:r="http://schemas.openxmlformats.org/officeDocument/2006/relationships" xmlns:p="http://schemas.openxmlformats.org/presentationml/2006/main">
+  <p:cSld>
+    <p:spTree>
+      <p:nvGrpSpPr>
+        <p:cNvPr id="1" name=""/>
+        <p:cNvGrpSpPr/>
+        <p:nvPr/>
+      </p:nvGrpSpPr>
+      <p:grpSpPr>
+        <a:xfrm>
+          <a:off x="0" y="0"/>
+          <a:ext cx="0" cy="0"/>
+          <a:chOff x="0" y="0"/>
+          <a:chExt cx="0" cy="0"/>
+        </a:xfrm>
+      </p:grpSpPr>
+      <p:sp>
+        <p:nvSpPr>
+          <p:cNvPr id="2" name="Title 1"/>
+          <p:cNvSpPr>
+            <a:spLocks noGrp="1"/>
+          </p:cNvSpPr>
+          <p:nvPr>
+            <p:ph type="title"/>
+          </p:nvPr>
+        </p:nvSpPr>
+        <p:spPr/>
+        <p:txBody>
+          <a:bodyPr/>
+          <a:lstStyle/>
+          <a:p>
+            <a:r>
+              <a:rPr lang="en-US" dirty="0" smtClean="0"/>
+              <a:t>Example [Print 0 to 9]</a:t>
+            </a:r>
+            <a:endParaRPr lang="en-US" dirty="0"/>
+          </a:p>
+        </p:txBody>
+      </p:sp>
+      <p:pic>
+        <p:nvPicPr>
+          <p:cNvPr id="3074" name="Picture 2"/>
+          <p:cNvPicPr>
+            <a:picLocks noChangeAspect="1" noChangeArrowheads="1"/>
+          </p:cNvPicPr>
+          <p:nvPr/>
+        </p:nvPicPr>
+        <p:blipFill>
+          <a:blip r:embed="rId2" cstate="print"/>
+          <a:srcRect/>
+          <a:stretch>
+            <a:fillRect/>
+          </a:stretch>
+        </p:blipFill>
+        <p:spPr bwMode="auto">
+          <a:xfrm>
+            <a:off x="1552575" y="1524000"/>
+            <a:ext cx="5991225" cy="5257800"/>
+          </a:xfrm>
+          <a:prstGeom prst="rect">
+            <a:avLst/>
+          </a:prstGeom>
+          <a:noFill/>
+          <a:ln w="9525">
+            <a:noFill/>
+            <a:miter lim="800000"/>
+            <a:headEnd/>
+            <a:tailEnd/>
+          </a:ln>
+        </p:spPr>
+      </p:pic>
+    </p:spTree>
+  </p:cSld>
+  <p:clrMapOvr>
+    <a:masterClrMapping/>
+  </p:clrMapOvr>
+  <p:timing>
+    <p:tnLst>
+      <p:par>
+        <p:cTn id="1" dur="indefinite" restart="never" nodeType="tmRoot"/>
+      </p:par>
+    </p:tnLst>
+  </p:timing>
+</p:sld>
+</file>
+
+<file path=ppt/slides/slide29.xml><?xml version="1.0" encoding="utf-8"?>
+<p:sld xmlns:a="http://schemas.openxmlformats.org/drawingml/2006/main" xmlns:r="http://schemas.openxmlformats.org/officeDocument/2006/relationships" xmlns:p="http://schemas.openxmlformats.org/presentationml/2006/main">
+  <p:cSld>
+    <p:spTree>
+      <p:nvGrpSpPr>
+        <p:cNvPr id="1" name=""/>
+        <p:cNvGrpSpPr/>
+        <p:nvPr/>
+      </p:nvGrpSpPr>
+      <p:grpSpPr>
+        <a:xfrm>
+          <a:off x="0" y="0"/>
+          <a:ext cx="0" cy="0"/>
+          <a:chOff x="0" y="0"/>
+          <a:chExt cx="0" cy="0"/>
+        </a:xfrm>
+      </p:grpSpPr>
+      <p:sp>
+        <p:nvSpPr>
+          <p:cNvPr id="2" name="Title 1"/>
+          <p:cNvSpPr>
+            <a:spLocks noGrp="1"/>
+          </p:cNvSpPr>
+          <p:nvPr>
+            <p:ph type="title"/>
+          </p:nvPr>
+        </p:nvSpPr>
+        <p:spPr/>
+        <p:txBody>
+          <a:bodyPr/>
+          <a:lstStyle/>
+          <a:p>
+            <a:r>
+              <a:rPr lang="en-US" dirty="0" smtClean="0"/>
+              <a:t>While loop </a:t>
+            </a:r>
+            <a:r>
+              <a:rPr lang="en-US" dirty="0" err="1" smtClean="0"/>
+              <a:t>vs</a:t>
+            </a:r>
+            <a:r>
+              <a:rPr lang="en-US" dirty="0" smtClean="0"/>
+              <a:t> User Input</a:t>
+            </a:r>
+            <a:endParaRPr lang="en-US" dirty="0"/>
+          </a:p>
+        </p:txBody>
+      </p:sp>
+      <p:pic>
+        <p:nvPicPr>
+          <p:cNvPr id="4098" name="Picture 2"/>
+          <p:cNvPicPr>
+            <a:picLocks noChangeAspect="1" noChangeArrowheads="1"/>
+          </p:cNvPicPr>
+          <p:nvPr/>
+        </p:nvPicPr>
+        <p:blipFill>
+          <a:blip r:embed="rId2" cstate="print"/>
+          <a:srcRect/>
+          <a:stretch>
+            <a:fillRect/>
+          </a:stretch>
+        </p:blipFill>
+        <p:spPr bwMode="auto">
+          <a:xfrm>
+            <a:off x="304800" y="1628775"/>
+            <a:ext cx="8534400" cy="4314825"/>
+          </a:xfrm>
+          <a:prstGeom prst="rect">
+            <a:avLst/>
+          </a:prstGeom>
+          <a:noFill/>
+          <a:ln w="9525">
+            <a:noFill/>
+            <a:miter lim="800000"/>
+            <a:headEnd/>
+            <a:tailEnd/>
+          </a:ln>
+        </p:spPr>
+      </p:pic>
+      <p:sp>
+        <p:nvSpPr>
+          <p:cNvPr id="5" name="Title 1"/>
+          <p:cNvSpPr txBox="1">
+            <a:spLocks/>
+          </p:cNvSpPr>
+          <p:nvPr/>
+        </p:nvSpPr>
+        <p:spPr>
+          <a:xfrm>
+            <a:off x="609600" y="6019800"/>
+            <a:ext cx="8229600" cy="762000"/>
+          </a:xfrm>
+          <a:prstGeom prst="rect">
+            <a:avLst/>
+          </a:prstGeom>
+          <a:solidFill>
+            <a:schemeClr val="accent6">
+              <a:lumMod val="20000"/>
+              <a:lumOff val="80000"/>
+              <a:alpha val="0"/>
+            </a:schemeClr>
+          </a:solidFill>
+        </p:spPr>
+        <p:txBody>
+          <a:bodyPr vert="horz" lIns="91440" tIns="45720" rIns="91440" bIns="45720" rtlCol="0" anchor="ctr">
+            <a:normAutofit/>
+          </a:bodyPr>
+          <a:lstStyle/>
+          <a:p>
+            <a:pPr marL="0" marR="0" lvl="0" indent="0" algn="ctr" defTabSz="914400" rtl="0" eaLnBrk="1" fontAlgn="auto" latinLnBrk="0" hangingPunct="1">
+              <a:lnSpc>
+                <a:spcPct val="100000"/>
+              </a:lnSpc>
+              <a:spcBef>
+                <a:spcPct val="0"/>
+              </a:spcBef>
+              <a:spcAft>
+                <a:spcPts val="0"/>
+              </a:spcAft>
+              <a:buClrTx/>
+              <a:buSzTx/>
+              <a:buFontTx/>
+              <a:buNone/>
+              <a:tabLst/>
+              <a:defRPr/>
+            </a:pPr>
+            <a:r>
+              <a:rPr lang="en-US" sz="3000" noProof="0" dirty="0" smtClean="0">
+                <a:latin typeface="Monotype Corsiva" pitchFamily="66" charset="0"/>
+                <a:ea typeface="+mj-ea"/>
+                <a:cs typeface="+mj-cs"/>
+              </a:rPr>
+              <a:t>Echo Program for Numbers</a:t>
+            </a:r>
+            <a:endParaRPr kumimoji="0" lang="en-US" sz="3000" b="0" i="0" u="none" strike="noStrike" kern="1200" cap="none" spc="0" normalizeH="0" baseline="0" noProof="0" dirty="0">
+              <a:ln>
+                <a:noFill/>
+              </a:ln>
+              <a:solidFill>
+                <a:schemeClr val="tx1"/>
+              </a:solidFill>
+              <a:effectLst/>
+              <a:uLnTx/>
+              <a:uFillTx/>
+              <a:latin typeface="Monotype Corsiva" pitchFamily="66" charset="0"/>
+              <a:ea typeface="+mj-ea"/>
+              <a:cs typeface="+mj-cs"/>
+            </a:endParaRPr>
+          </a:p>
+        </p:txBody>
+      </p:sp>
+    </p:spTree>
+  </p:cSld>
+  <p:clrMapOvr>
+    <a:masterClrMapping/>
+  </p:clrMapOvr>
 </p:sld>
 </file>
 
@@ -6995,13 +7593,13 @@
         </p:spPr>
         <p:style>
           <a:lnRef idx="1">
-            <a:schemeClr val="accent1"/>
+            <a:schemeClr val="accent2"/>
           </a:lnRef>
           <a:fillRef idx="2">
-            <a:schemeClr val="accent1"/>
+            <a:schemeClr val="accent2"/>
           </a:fillRef>
           <a:effectRef idx="1">
-            <a:schemeClr val="accent1"/>
+            <a:schemeClr val="accent2"/>
           </a:effectRef>
           <a:fontRef idx="minor">
             <a:schemeClr val="dk1"/>
@@ -7073,13 +7671,13 @@
         </p:spPr>
         <p:style>
           <a:lnRef idx="1">
-            <a:schemeClr val="accent1"/>
+            <a:schemeClr val="accent2"/>
           </a:lnRef>
           <a:fillRef idx="2">
-            <a:schemeClr val="accent1"/>
+            <a:schemeClr val="accent2"/>
           </a:fillRef>
           <a:effectRef idx="1">
-            <a:schemeClr val="accent1"/>
+            <a:schemeClr val="accent2"/>
           </a:effectRef>
           <a:fontRef idx="minor">
             <a:schemeClr val="dk1"/>
@@ -7115,13 +7713,13 @@
         </p:spPr>
         <p:style>
           <a:lnRef idx="1">
-            <a:schemeClr val="accent1"/>
+            <a:schemeClr val="accent2"/>
           </a:lnRef>
           <a:fillRef idx="2">
-            <a:schemeClr val="accent1"/>
+            <a:schemeClr val="accent2"/>
           </a:fillRef>
           <a:effectRef idx="1">
-            <a:schemeClr val="accent1"/>
+            <a:schemeClr val="accent2"/>
           </a:effectRef>
           <a:fontRef idx="minor">
             <a:schemeClr val="dk1"/>
@@ -7866,6 +8464,1362 @@
 </p:sld>
 </file>
 
+<file path=ppt/slides/slide30.xml><?xml version="1.0" encoding="utf-8"?>
+<p:sld xmlns:a="http://schemas.openxmlformats.org/drawingml/2006/main" xmlns:r="http://schemas.openxmlformats.org/officeDocument/2006/relationships" xmlns:p="http://schemas.openxmlformats.org/presentationml/2006/main">
+  <p:cSld>
+    <p:spTree>
+      <p:nvGrpSpPr>
+        <p:cNvPr id="1" name=""/>
+        <p:cNvGrpSpPr/>
+        <p:nvPr/>
+      </p:nvGrpSpPr>
+      <p:grpSpPr>
+        <a:xfrm>
+          <a:off x="0" y="0"/>
+          <a:ext cx="0" cy="0"/>
+          <a:chOff x="0" y="0"/>
+          <a:chExt cx="0" cy="0"/>
+        </a:xfrm>
+      </p:grpSpPr>
+      <p:sp>
+        <p:nvSpPr>
+          <p:cNvPr id="2" name="Title 1"/>
+          <p:cNvSpPr>
+            <a:spLocks noGrp="1"/>
+          </p:cNvSpPr>
+          <p:nvPr>
+            <p:ph type="title"/>
+          </p:nvPr>
+        </p:nvSpPr>
+        <p:spPr/>
+        <p:txBody>
+          <a:bodyPr/>
+          <a:lstStyle/>
+          <a:p>
+            <a:r>
+              <a:rPr lang="en-US" dirty="0" smtClean="0"/>
+              <a:t>Output</a:t>
+            </a:r>
+            <a:endParaRPr lang="en-US" dirty="0"/>
+          </a:p>
+        </p:txBody>
+      </p:sp>
+      <p:pic>
+        <p:nvPicPr>
+          <p:cNvPr id="5122" name="Picture 2"/>
+          <p:cNvPicPr>
+            <a:picLocks noChangeAspect="1" noChangeArrowheads="1"/>
+          </p:cNvPicPr>
+          <p:nvPr/>
+        </p:nvPicPr>
+        <p:blipFill>
+          <a:blip r:embed="rId2" cstate="print"/>
+          <a:srcRect/>
+          <a:stretch>
+            <a:fillRect/>
+          </a:stretch>
+        </p:blipFill>
+        <p:spPr bwMode="auto">
+          <a:xfrm>
+            <a:off x="918122" y="1676400"/>
+            <a:ext cx="7235278" cy="4343400"/>
+          </a:xfrm>
+          <a:prstGeom prst="rect">
+            <a:avLst/>
+          </a:prstGeom>
+          <a:noFill/>
+          <a:ln w="9525">
+            <a:noFill/>
+            <a:miter lim="800000"/>
+            <a:headEnd/>
+            <a:tailEnd/>
+          </a:ln>
+        </p:spPr>
+      </p:pic>
+    </p:spTree>
+  </p:cSld>
+  <p:clrMapOvr>
+    <a:masterClrMapping/>
+  </p:clrMapOvr>
+</p:sld>
+</file>
+
+<file path=ppt/slides/slide31.xml><?xml version="1.0" encoding="utf-8"?>
+<p:sld xmlns:a="http://schemas.openxmlformats.org/drawingml/2006/main" xmlns:r="http://schemas.openxmlformats.org/officeDocument/2006/relationships" xmlns:p="http://schemas.openxmlformats.org/presentationml/2006/main">
+  <p:cSld>
+    <p:spTree>
+      <p:nvGrpSpPr>
+        <p:cNvPr id="1" name=""/>
+        <p:cNvGrpSpPr/>
+        <p:nvPr/>
+      </p:nvGrpSpPr>
+      <p:grpSpPr>
+        <a:xfrm>
+          <a:off x="0" y="0"/>
+          <a:ext cx="0" cy="0"/>
+          <a:chOff x="0" y="0"/>
+          <a:chExt cx="0" cy="0"/>
+        </a:xfrm>
+      </p:grpSpPr>
+      <p:sp>
+        <p:nvSpPr>
+          <p:cNvPr id="2" name="Title 1"/>
+          <p:cNvSpPr>
+            <a:spLocks noGrp="1"/>
+          </p:cNvSpPr>
+          <p:nvPr>
+            <p:ph type="title"/>
+          </p:nvPr>
+        </p:nvSpPr>
+        <p:spPr/>
+        <p:txBody>
+          <a:bodyPr/>
+          <a:lstStyle/>
+          <a:p>
+            <a:r>
+              <a:rPr lang="en-US" dirty="0" smtClean="0"/>
+              <a:t>DO-WHILE LOOP</a:t>
+            </a:r>
+            <a:endParaRPr lang="en-US" dirty="0"/>
+          </a:p>
+        </p:txBody>
+      </p:sp>
+      <p:sp>
+        <p:nvSpPr>
+          <p:cNvPr id="3" name="Content Placeholder 2"/>
+          <p:cNvSpPr>
+            <a:spLocks noGrp="1"/>
+          </p:cNvSpPr>
+          <p:nvPr>
+            <p:ph idx="1"/>
+          </p:nvPr>
+        </p:nvSpPr>
+        <p:spPr/>
+        <p:txBody>
+          <a:bodyPr/>
+          <a:lstStyle/>
+          <a:p>
+            <a:r>
+              <a:rPr lang="en-US" dirty="0" smtClean="0"/>
+              <a:t>It is also non deterministic loop.</a:t>
+            </a:r>
+          </a:p>
+          <a:p>
+            <a:r>
+              <a:rPr lang="en-US" dirty="0" smtClean="0"/>
+              <a:t>A block of code executed repeatedly until the conditions remains satisfied.</a:t>
+            </a:r>
+          </a:p>
+          <a:p>
+            <a:r>
+              <a:rPr lang="en-US" dirty="0" smtClean="0"/>
+              <a:t>It executes loop block at least once even the condition is not satisfied.</a:t>
+            </a:r>
+          </a:p>
+          <a:p>
+            <a:r>
+              <a:rPr lang="en-US" dirty="0" smtClean="0"/>
+              <a:t>This is also known as exit control loop.</a:t>
+            </a:r>
+            <a:endParaRPr lang="en-US" dirty="0"/>
+          </a:p>
+        </p:txBody>
+      </p:sp>
+    </p:spTree>
+  </p:cSld>
+  <p:clrMapOvr>
+    <a:masterClrMapping/>
+  </p:clrMapOvr>
+</p:sld>
+</file>
+
+<file path=ppt/slides/slide32.xml><?xml version="1.0" encoding="utf-8"?>
+<p:sld xmlns:a="http://schemas.openxmlformats.org/drawingml/2006/main" xmlns:r="http://schemas.openxmlformats.org/officeDocument/2006/relationships" xmlns:p="http://schemas.openxmlformats.org/presentationml/2006/main">
+  <p:cSld>
+    <p:spTree>
+      <p:nvGrpSpPr>
+        <p:cNvPr id="1" name=""/>
+        <p:cNvGrpSpPr/>
+        <p:nvPr/>
+      </p:nvGrpSpPr>
+      <p:grpSpPr>
+        <a:xfrm>
+          <a:off x="0" y="0"/>
+          <a:ext cx="0" cy="0"/>
+          <a:chOff x="0" y="0"/>
+          <a:chExt cx="0" cy="0"/>
+        </a:xfrm>
+      </p:grpSpPr>
+      <p:sp>
+        <p:nvSpPr>
+          <p:cNvPr id="2" name="Title 1"/>
+          <p:cNvSpPr>
+            <a:spLocks noGrp="1"/>
+          </p:cNvSpPr>
+          <p:nvPr>
+            <p:ph type="title"/>
+          </p:nvPr>
+        </p:nvSpPr>
+        <p:spPr/>
+        <p:txBody>
+          <a:bodyPr/>
+          <a:lstStyle/>
+          <a:p>
+            <a:r>
+              <a:rPr lang="en-US" dirty="0" smtClean="0"/>
+              <a:t>Syntax</a:t>
+            </a:r>
+            <a:endParaRPr lang="en-US" dirty="0"/>
+          </a:p>
+        </p:txBody>
+      </p:sp>
+      <p:sp>
+        <p:nvSpPr>
+          <p:cNvPr id="3" name="Content Placeholder 2"/>
+          <p:cNvSpPr>
+            <a:spLocks noGrp="1"/>
+          </p:cNvSpPr>
+          <p:nvPr>
+            <p:ph idx="1"/>
+          </p:nvPr>
+        </p:nvSpPr>
+        <p:spPr/>
+        <p:txBody>
+          <a:bodyPr/>
+          <a:lstStyle/>
+          <a:p>
+            <a:pPr>
+              <a:buNone/>
+            </a:pPr>
+            <a:r>
+              <a:rPr lang="en-US" dirty="0" smtClean="0">
+                <a:solidFill>
+                  <a:srgbClr val="FF0000"/>
+                </a:solidFill>
+                <a:latin typeface="Consolas" pitchFamily="49" charset="0"/>
+              </a:rPr>
+              <a:t>do</a:t>
+            </a:r>
+            <a:r>
+              <a:rPr lang="en-US" dirty="0" smtClean="0">
+                <a:latin typeface="Consolas" pitchFamily="49" charset="0"/>
+              </a:rPr>
+              <a:t>{</a:t>
+            </a:r>
+          </a:p>
+          <a:p>
+            <a:pPr>
+              <a:buNone/>
+            </a:pPr>
+            <a:r>
+              <a:rPr lang="en-US" dirty="0" smtClean="0">
+                <a:latin typeface="Consolas" pitchFamily="49" charset="0"/>
+              </a:rPr>
+              <a:t>…</a:t>
+            </a:r>
+          </a:p>
+          <a:p>
+            <a:pPr>
+              <a:buNone/>
+            </a:pPr>
+            <a:r>
+              <a:rPr lang="en-US" dirty="0" smtClean="0">
+                <a:latin typeface="Consolas" pitchFamily="49" charset="0"/>
+              </a:rPr>
+              <a:t>// Block of do-while loop</a:t>
+            </a:r>
+          </a:p>
+          <a:p>
+            <a:pPr>
+              <a:buNone/>
+            </a:pPr>
+            <a:r>
+              <a:rPr lang="en-US" dirty="0" smtClean="0">
+                <a:latin typeface="Consolas" pitchFamily="49" charset="0"/>
+              </a:rPr>
+              <a:t>…</a:t>
+            </a:r>
+          </a:p>
+          <a:p>
+            <a:pPr>
+              <a:buNone/>
+            </a:pPr>
+            <a:r>
+              <a:rPr lang="en-US" dirty="0" smtClean="0">
+                <a:latin typeface="Consolas" pitchFamily="49" charset="0"/>
+              </a:rPr>
+              <a:t>}</a:t>
+            </a:r>
+            <a:r>
+              <a:rPr lang="en-US" dirty="0" smtClean="0">
+                <a:solidFill>
+                  <a:srgbClr val="FF0000"/>
+                </a:solidFill>
+                <a:latin typeface="Consolas" pitchFamily="49" charset="0"/>
+              </a:rPr>
+              <a:t>while</a:t>
+            </a:r>
+            <a:r>
+              <a:rPr lang="en-US" dirty="0" smtClean="0">
+                <a:latin typeface="Consolas" pitchFamily="49" charset="0"/>
+              </a:rPr>
+              <a:t>(Condition);</a:t>
+            </a:r>
+          </a:p>
+        </p:txBody>
+      </p:sp>
+    </p:spTree>
+  </p:cSld>
+  <p:clrMapOvr>
+    <a:masterClrMapping/>
+  </p:clrMapOvr>
+  <p:timing>
+    <p:tnLst>
+      <p:par>
+        <p:cTn id="1" dur="indefinite" restart="never" nodeType="tmRoot"/>
+      </p:par>
+    </p:tnLst>
+  </p:timing>
+</p:sld>
+</file>
+
+<file path=ppt/slides/slide33.xml><?xml version="1.0" encoding="utf-8"?>
+<p:sld xmlns:a="http://schemas.openxmlformats.org/drawingml/2006/main" xmlns:r="http://schemas.openxmlformats.org/officeDocument/2006/relationships" xmlns:p="http://schemas.openxmlformats.org/presentationml/2006/main">
+  <p:cSld>
+    <p:spTree>
+      <p:nvGrpSpPr>
+        <p:cNvPr id="1" name=""/>
+        <p:cNvGrpSpPr/>
+        <p:nvPr/>
+      </p:nvGrpSpPr>
+      <p:grpSpPr>
+        <a:xfrm>
+          <a:off x="0" y="0"/>
+          <a:ext cx="0" cy="0"/>
+          <a:chOff x="0" y="0"/>
+          <a:chExt cx="0" cy="0"/>
+        </a:xfrm>
+      </p:grpSpPr>
+      <p:sp>
+        <p:nvSpPr>
+          <p:cNvPr id="2" name="Title 1"/>
+          <p:cNvSpPr>
+            <a:spLocks noGrp="1"/>
+          </p:cNvSpPr>
+          <p:nvPr>
+            <p:ph type="title"/>
+          </p:nvPr>
+        </p:nvSpPr>
+        <p:spPr/>
+        <p:txBody>
+          <a:bodyPr/>
+          <a:lstStyle/>
+          <a:p>
+            <a:r>
+              <a:rPr lang="en-US" dirty="0" smtClean="0"/>
+              <a:t>Example Do While</a:t>
+            </a:r>
+            <a:endParaRPr lang="en-US" dirty="0"/>
+          </a:p>
+        </p:txBody>
+      </p:sp>
+      <p:pic>
+        <p:nvPicPr>
+          <p:cNvPr id="6146" name="Picture 2"/>
+          <p:cNvPicPr>
+            <a:picLocks noGrp="1" noChangeAspect="1" noChangeArrowheads="1"/>
+          </p:cNvPicPr>
+          <p:nvPr>
+            <p:ph idx="1"/>
+          </p:nvPr>
+        </p:nvPicPr>
+        <p:blipFill>
+          <a:blip r:embed="rId2" cstate="print"/>
+          <a:srcRect/>
+          <a:stretch>
+            <a:fillRect/>
+          </a:stretch>
+        </p:blipFill>
+        <p:spPr bwMode="auto">
+          <a:xfrm>
+            <a:off x="762000" y="1467502"/>
+            <a:ext cx="7772400" cy="5161898"/>
+          </a:xfrm>
+          <a:prstGeom prst="rect">
+            <a:avLst/>
+          </a:prstGeom>
+          <a:noFill/>
+          <a:ln w="9525">
+            <a:noFill/>
+            <a:miter lim="800000"/>
+            <a:headEnd/>
+            <a:tailEnd/>
+          </a:ln>
+        </p:spPr>
+      </p:pic>
+    </p:spTree>
+  </p:cSld>
+  <p:clrMapOvr>
+    <a:masterClrMapping/>
+  </p:clrMapOvr>
+</p:sld>
+</file>
+
+<file path=ppt/slides/slide34.xml><?xml version="1.0" encoding="utf-8"?>
+<p:sld xmlns:a="http://schemas.openxmlformats.org/drawingml/2006/main" xmlns:r="http://schemas.openxmlformats.org/officeDocument/2006/relationships" xmlns:p="http://schemas.openxmlformats.org/presentationml/2006/main">
+  <p:cSld>
+    <p:spTree>
+      <p:nvGrpSpPr>
+        <p:cNvPr id="1" name=""/>
+        <p:cNvGrpSpPr/>
+        <p:nvPr/>
+      </p:nvGrpSpPr>
+      <p:grpSpPr>
+        <a:xfrm>
+          <a:off x="0" y="0"/>
+          <a:ext cx="0" cy="0"/>
+          <a:chOff x="0" y="0"/>
+          <a:chExt cx="0" cy="0"/>
+        </a:xfrm>
+      </p:grpSpPr>
+      <p:sp>
+        <p:nvSpPr>
+          <p:cNvPr id="2" name="Title 1"/>
+          <p:cNvSpPr>
+            <a:spLocks noGrp="1"/>
+          </p:cNvSpPr>
+          <p:nvPr>
+            <p:ph type="title"/>
+          </p:nvPr>
+        </p:nvSpPr>
+        <p:spPr/>
+        <p:txBody>
+          <a:bodyPr/>
+          <a:lstStyle/>
+          <a:p>
+            <a:r>
+              <a:rPr lang="en-US" dirty="0" smtClean="0"/>
+              <a:t>Problem</a:t>
+            </a:r>
+            <a:endParaRPr lang="en-US" dirty="0"/>
+          </a:p>
+        </p:txBody>
+      </p:sp>
+      <p:sp>
+        <p:nvSpPr>
+          <p:cNvPr id="3" name="Content Placeholder 2"/>
+          <p:cNvSpPr>
+            <a:spLocks noGrp="1"/>
+          </p:cNvSpPr>
+          <p:nvPr>
+            <p:ph idx="1"/>
+          </p:nvPr>
+        </p:nvSpPr>
+        <p:spPr/>
+        <p:txBody>
+          <a:bodyPr/>
+          <a:lstStyle/>
+          <a:p>
+            <a:r>
+              <a:rPr lang="en-US" dirty="0" smtClean="0"/>
+              <a:t>Extend the Calculator Program [Already done with switch case] for repeated inputs until user wants to exit.</a:t>
+            </a:r>
+          </a:p>
+        </p:txBody>
+      </p:sp>
+    </p:spTree>
+  </p:cSld>
+  <p:clrMapOvr>
+    <a:masterClrMapping/>
+  </p:clrMapOvr>
+</p:sld>
+</file>
+
+<file path=ppt/slides/slide35.xml><?xml version="1.0" encoding="utf-8"?>
+<p:sld xmlns:a="http://schemas.openxmlformats.org/drawingml/2006/main" xmlns:r="http://schemas.openxmlformats.org/officeDocument/2006/relationships" xmlns:p="http://schemas.openxmlformats.org/presentationml/2006/main">
+  <p:cSld>
+    <p:spTree>
+      <p:nvGrpSpPr>
+        <p:cNvPr id="1" name=""/>
+        <p:cNvGrpSpPr/>
+        <p:nvPr/>
+      </p:nvGrpSpPr>
+      <p:grpSpPr>
+        <a:xfrm>
+          <a:off x="0" y="0"/>
+          <a:ext cx="0" cy="0"/>
+          <a:chOff x="0" y="0"/>
+          <a:chExt cx="0" cy="0"/>
+        </a:xfrm>
+      </p:grpSpPr>
+      <p:sp>
+        <p:nvSpPr>
+          <p:cNvPr id="2" name="Title 1"/>
+          <p:cNvSpPr>
+            <a:spLocks noGrp="1"/>
+          </p:cNvSpPr>
+          <p:nvPr>
+            <p:ph type="ctrTitle"/>
+          </p:nvPr>
+        </p:nvSpPr>
+        <p:spPr>
+          <a:xfrm>
+            <a:off x="685800" y="609600"/>
+            <a:ext cx="7772400" cy="1143000"/>
+          </a:xfrm>
+        </p:spPr>
+        <p:txBody>
+          <a:bodyPr>
+            <a:normAutofit/>
+          </a:bodyPr>
+          <a:lstStyle/>
+          <a:p>
+            <a:r>
+              <a:rPr lang="en-US" dirty="0" smtClean="0"/>
+              <a:t>Control Flow</a:t>
+            </a:r>
+            <a:endParaRPr lang="en-US" dirty="0"/>
+          </a:p>
+        </p:txBody>
+      </p:sp>
+      <p:sp>
+        <p:nvSpPr>
+          <p:cNvPr id="3" name="Subtitle 2"/>
+          <p:cNvSpPr>
+            <a:spLocks noGrp="1"/>
+          </p:cNvSpPr>
+          <p:nvPr>
+            <p:ph type="subTitle" idx="1"/>
+          </p:nvPr>
+        </p:nvSpPr>
+        <p:spPr>
+          <a:xfrm>
+            <a:off x="4038600" y="4191000"/>
+            <a:ext cx="4191000" cy="1752600"/>
+          </a:xfrm>
+        </p:spPr>
+        <p:txBody>
+          <a:bodyPr>
+            <a:normAutofit lnSpcReduction="10000"/>
+          </a:bodyPr>
+          <a:lstStyle/>
+          <a:p>
+            <a:pPr algn="r"/>
+            <a:r>
+              <a:rPr lang="en-US" sz="2200" dirty="0" err="1" smtClean="0">
+                <a:solidFill>
+                  <a:schemeClr val="tx1"/>
+                </a:solidFill>
+                <a:latin typeface="Cambria" pitchFamily="18" charset="0"/>
+              </a:rPr>
+              <a:t>Rajasekaran</a:t>
+            </a:r>
+            <a:r>
+              <a:rPr lang="en-US" sz="2200" dirty="0" smtClean="0">
+                <a:solidFill>
+                  <a:schemeClr val="tx1"/>
+                </a:solidFill>
+                <a:latin typeface="Cambria" pitchFamily="18" charset="0"/>
+              </a:rPr>
+              <a:t> S</a:t>
+            </a:r>
+          </a:p>
+          <a:p>
+            <a:pPr algn="r"/>
+            <a:r>
+              <a:rPr lang="en-US" sz="1600" dirty="0" smtClean="0">
+                <a:solidFill>
+                  <a:schemeClr val="tx1"/>
+                </a:solidFill>
+                <a:latin typeface="Cambria" pitchFamily="18" charset="0"/>
+              </a:rPr>
+              <a:t>Assistant Professor,</a:t>
+            </a:r>
+          </a:p>
+          <a:p>
+            <a:pPr algn="r"/>
+            <a:r>
+              <a:rPr lang="en-US" sz="1600" dirty="0" smtClean="0">
+                <a:solidFill>
+                  <a:schemeClr val="tx1"/>
+                </a:solidFill>
+                <a:latin typeface="Cambria" pitchFamily="18" charset="0"/>
+              </a:rPr>
+              <a:t>Department of Information Technology,</a:t>
+            </a:r>
+          </a:p>
+          <a:p>
+            <a:pPr algn="r"/>
+            <a:r>
+              <a:rPr lang="en-US" sz="1600" dirty="0" err="1" smtClean="0">
+                <a:solidFill>
+                  <a:schemeClr val="tx1"/>
+                </a:solidFill>
+                <a:latin typeface="Cambria" pitchFamily="18" charset="0"/>
+              </a:rPr>
+              <a:t>KGiSL</a:t>
+            </a:r>
+            <a:r>
+              <a:rPr lang="en-US" sz="1600" dirty="0" smtClean="0">
+                <a:solidFill>
+                  <a:schemeClr val="tx1"/>
+                </a:solidFill>
+                <a:latin typeface="Cambria" pitchFamily="18" charset="0"/>
+              </a:rPr>
+              <a:t> Institute of Technology,</a:t>
+            </a:r>
+          </a:p>
+          <a:p>
+            <a:pPr algn="r"/>
+            <a:r>
+              <a:rPr lang="en-US" sz="1600" dirty="0" smtClean="0">
+                <a:solidFill>
+                  <a:schemeClr val="tx1"/>
+                </a:solidFill>
+              </a:rPr>
+              <a:t>email: </a:t>
+            </a:r>
+            <a:r>
+              <a:rPr lang="en-US" sz="1600" dirty="0" smtClean="0">
+                <a:solidFill>
+                  <a:schemeClr val="tx1"/>
+                </a:solidFill>
+                <a:hlinkClick r:id="rId2"/>
+              </a:rPr>
+              <a:t>proffraja@gmail.com</a:t>
+            </a:r>
+            <a:endParaRPr lang="en-US" sz="1600" dirty="0" smtClean="0">
+              <a:solidFill>
+                <a:schemeClr val="tx1"/>
+              </a:solidFill>
+            </a:endParaRPr>
+          </a:p>
+          <a:p>
+            <a:pPr lvl="0" algn="r"/>
+            <a:r>
+              <a:rPr lang="en-US" sz="1600" dirty="0" err="1" smtClean="0"/>
+              <a:t>Github:</a:t>
+            </a:r>
+            <a:r>
+              <a:rPr lang="en-US" sz="1600" dirty="0" err="1" smtClean="0">
+                <a:hlinkClick r:id="rId3"/>
+              </a:rPr>
+              <a:t>www.github.com</a:t>
+            </a:r>
+            <a:r>
+              <a:rPr lang="en-US" sz="1600" dirty="0" smtClean="0">
+                <a:hlinkClick r:id="rId3"/>
+              </a:rPr>
+              <a:t>/</a:t>
+            </a:r>
+            <a:r>
+              <a:rPr lang="en-US" sz="1600" dirty="0" err="1" smtClean="0">
+                <a:hlinkClick r:id="rId3"/>
+              </a:rPr>
+              <a:t>rajasekaranap</a:t>
+            </a:r>
+            <a:endParaRPr lang="en-US" sz="1600" dirty="0" smtClean="0"/>
+          </a:p>
+          <a:p>
+            <a:pPr algn="r"/>
+            <a:endParaRPr lang="en-US" sz="1600" dirty="0">
+              <a:solidFill>
+                <a:schemeClr val="tx1"/>
+              </a:solidFill>
+              <a:latin typeface="Cambria" pitchFamily="18" charset="0"/>
+            </a:endParaRPr>
+          </a:p>
+        </p:txBody>
+      </p:sp>
+      <p:sp>
+        <p:nvSpPr>
+          <p:cNvPr id="4" name="Title 1"/>
+          <p:cNvSpPr txBox="1">
+            <a:spLocks/>
+          </p:cNvSpPr>
+          <p:nvPr/>
+        </p:nvSpPr>
+        <p:spPr>
+          <a:xfrm>
+            <a:off x="685800" y="2209800"/>
+            <a:ext cx="7772400" cy="1143000"/>
+          </a:xfrm>
+          <a:prstGeom prst="rect">
+            <a:avLst/>
+          </a:prstGeom>
+        </p:spPr>
+        <p:style>
+          <a:lnRef idx="2">
+            <a:schemeClr val="accent1"/>
+          </a:lnRef>
+          <a:fillRef idx="1">
+            <a:schemeClr val="lt1"/>
+          </a:fillRef>
+          <a:effectRef idx="0">
+            <a:schemeClr val="accent1"/>
+          </a:effectRef>
+          <a:fontRef idx="minor">
+            <a:schemeClr val="dk1"/>
+          </a:fontRef>
+        </p:style>
+        <p:txBody>
+          <a:bodyPr vert="horz" lIns="91440" tIns="45720" rIns="91440" bIns="45720" rtlCol="0" anchor="ctr">
+            <a:normAutofit fontScale="92500" lnSpcReduction="10000"/>
+          </a:bodyPr>
+          <a:lstStyle/>
+          <a:p>
+            <a:pPr marL="0" marR="0" lvl="0" indent="0" algn="ctr" defTabSz="914400" rtl="0" eaLnBrk="1" fontAlgn="auto" latinLnBrk="0" hangingPunct="1">
+              <a:lnSpc>
+                <a:spcPct val="100000"/>
+              </a:lnSpc>
+              <a:spcBef>
+                <a:spcPct val="0"/>
+              </a:spcBef>
+              <a:spcAft>
+                <a:spcPts val="0"/>
+              </a:spcAft>
+              <a:buClrTx/>
+              <a:buSzTx/>
+              <a:buFontTx/>
+              <a:buNone/>
+              <a:tabLst/>
+              <a:defRPr/>
+            </a:pPr>
+            <a:r>
+              <a:rPr kumimoji="0" lang="en-US" sz="4400" b="0" i="0" u="none" strike="noStrike" kern="1200" cap="none" spc="0" normalizeH="0" baseline="0" noProof="0" dirty="0" smtClean="0">
+                <a:ln>
+                  <a:noFill/>
+                </a:ln>
+                <a:solidFill>
+                  <a:schemeClr val="tx1"/>
+                </a:solidFill>
+                <a:effectLst/>
+                <a:uLnTx/>
+                <a:uFillTx/>
+                <a:latin typeface="Cambria" pitchFamily="18" charset="0"/>
+                <a:ea typeface="+mj-ea"/>
+                <a:cs typeface="+mj-cs"/>
+              </a:rPr>
+              <a:t>Jump</a:t>
+            </a:r>
+            <a:r>
+              <a:rPr kumimoji="0" lang="en-US" sz="4400" b="0" i="0" u="none" strike="noStrike" kern="1200" cap="none" spc="0" normalizeH="0" noProof="0" dirty="0" smtClean="0">
+                <a:ln>
+                  <a:noFill/>
+                </a:ln>
+                <a:solidFill>
+                  <a:schemeClr val="tx1"/>
+                </a:solidFill>
+                <a:effectLst/>
+                <a:uLnTx/>
+                <a:uFillTx/>
+                <a:latin typeface="Cambria" pitchFamily="18" charset="0"/>
+                <a:ea typeface="+mj-ea"/>
+                <a:cs typeface="+mj-cs"/>
+              </a:rPr>
+              <a:t> Statements </a:t>
+            </a:r>
+          </a:p>
+          <a:p>
+            <a:pPr marL="0" marR="0" lvl="0" indent="0" algn="ctr" defTabSz="914400" rtl="0" eaLnBrk="1" fontAlgn="auto" latinLnBrk="0" hangingPunct="1">
+              <a:lnSpc>
+                <a:spcPct val="100000"/>
+              </a:lnSpc>
+              <a:spcBef>
+                <a:spcPct val="0"/>
+              </a:spcBef>
+              <a:spcAft>
+                <a:spcPts val="0"/>
+              </a:spcAft>
+              <a:buClrTx/>
+              <a:buSzTx/>
+              <a:buFontTx/>
+              <a:buNone/>
+              <a:tabLst/>
+              <a:defRPr/>
+            </a:pPr>
+            <a:r>
+              <a:rPr lang="en-US" sz="3200" dirty="0" smtClean="0">
+                <a:solidFill>
+                  <a:schemeClr val="tx1"/>
+                </a:solidFill>
+                <a:latin typeface="Cambria" pitchFamily="18" charset="0"/>
+                <a:ea typeface="+mj-ea"/>
+                <a:cs typeface="+mj-cs"/>
+              </a:rPr>
+              <a:t>[Unconditional Jumps] </a:t>
+            </a:r>
+            <a:endParaRPr kumimoji="0" lang="en-US" sz="3200" b="0" i="0" u="none" strike="noStrike" kern="1200" cap="none" spc="0" normalizeH="0" baseline="0" noProof="0" dirty="0">
+              <a:ln>
+                <a:noFill/>
+              </a:ln>
+              <a:solidFill>
+                <a:schemeClr val="tx1"/>
+              </a:solidFill>
+              <a:effectLst/>
+              <a:uLnTx/>
+              <a:uFillTx/>
+              <a:latin typeface="Cambria" pitchFamily="18" charset="0"/>
+              <a:ea typeface="+mj-ea"/>
+              <a:cs typeface="+mj-cs"/>
+            </a:endParaRPr>
+          </a:p>
+        </p:txBody>
+      </p:sp>
+    </p:spTree>
+  </p:cSld>
+  <p:clrMapOvr>
+    <a:masterClrMapping/>
+  </p:clrMapOvr>
+  <p:timing>
+    <p:tnLst>
+      <p:par>
+        <p:cTn id="1" dur="indefinite" restart="never" nodeType="tmRoot"/>
+      </p:par>
+    </p:tnLst>
+  </p:timing>
+</p:sld>
+</file>
+
+<file path=ppt/slides/slide36.xml><?xml version="1.0" encoding="utf-8"?>
+<p:sld xmlns:a="http://schemas.openxmlformats.org/drawingml/2006/main" xmlns:r="http://schemas.openxmlformats.org/officeDocument/2006/relationships" xmlns:p="http://schemas.openxmlformats.org/presentationml/2006/main">
+  <p:cSld>
+    <p:spTree>
+      <p:nvGrpSpPr>
+        <p:cNvPr id="1" name=""/>
+        <p:cNvGrpSpPr/>
+        <p:nvPr/>
+      </p:nvGrpSpPr>
+      <p:grpSpPr>
+        <a:xfrm>
+          <a:off x="0" y="0"/>
+          <a:ext cx="0" cy="0"/>
+          <a:chOff x="0" y="0"/>
+          <a:chExt cx="0" cy="0"/>
+        </a:xfrm>
+      </p:grpSpPr>
+      <p:sp>
+        <p:nvSpPr>
+          <p:cNvPr id="2" name="Title 1"/>
+          <p:cNvSpPr>
+            <a:spLocks noGrp="1"/>
+          </p:cNvSpPr>
+          <p:nvPr>
+            <p:ph type="title"/>
+          </p:nvPr>
+        </p:nvSpPr>
+        <p:spPr/>
+        <p:txBody>
+          <a:bodyPr/>
+          <a:lstStyle/>
+          <a:p>
+            <a:r>
+              <a:rPr lang="en-US" dirty="0" smtClean="0"/>
+              <a:t>Unconditional Statements</a:t>
+            </a:r>
+            <a:endParaRPr lang="en-US" dirty="0"/>
+          </a:p>
+        </p:txBody>
+      </p:sp>
+      <p:sp>
+        <p:nvSpPr>
+          <p:cNvPr id="3" name="Content Placeholder 2"/>
+          <p:cNvSpPr>
+            <a:spLocks noGrp="1"/>
+          </p:cNvSpPr>
+          <p:nvPr>
+            <p:ph idx="1"/>
+          </p:nvPr>
+        </p:nvSpPr>
+        <p:spPr/>
+        <p:txBody>
+          <a:bodyPr>
+            <a:normAutofit fontScale="92500" lnSpcReduction="20000"/>
+          </a:bodyPr>
+          <a:lstStyle/>
+          <a:p>
+            <a:r>
+              <a:rPr lang="en-US" dirty="0" smtClean="0"/>
+              <a:t>It transfers the control from one part of the program to another part of the program without any checking of condition.</a:t>
+            </a:r>
+          </a:p>
+          <a:p>
+            <a:r>
+              <a:rPr lang="en-US" dirty="0" smtClean="0"/>
+              <a:t>This statements doesn't have any conditions to verify.</a:t>
+            </a:r>
+          </a:p>
+          <a:p>
+            <a:r>
+              <a:rPr lang="en-US" dirty="0" smtClean="0"/>
+              <a:t>As soon as the execution encounters these statements immediately the jump has been made.</a:t>
+            </a:r>
+          </a:p>
+          <a:p>
+            <a:r>
+              <a:rPr lang="en-US" dirty="0" smtClean="0"/>
+              <a:t>There are two types of statements</a:t>
+            </a:r>
+          </a:p>
+          <a:p>
+            <a:pPr lvl="1"/>
+            <a:r>
+              <a:rPr lang="en-US" dirty="0" smtClean="0">
+                <a:solidFill>
+                  <a:srgbClr val="FF0000"/>
+                </a:solidFill>
+              </a:rPr>
+              <a:t>Continue</a:t>
+            </a:r>
+          </a:p>
+          <a:p>
+            <a:pPr lvl="1"/>
+            <a:r>
+              <a:rPr lang="en-US" dirty="0" smtClean="0">
+                <a:solidFill>
+                  <a:srgbClr val="FF0000"/>
+                </a:solidFill>
+              </a:rPr>
+              <a:t>Break</a:t>
+            </a:r>
+          </a:p>
+        </p:txBody>
+      </p:sp>
+    </p:spTree>
+  </p:cSld>
+  <p:clrMapOvr>
+    <a:masterClrMapping/>
+  </p:clrMapOvr>
+</p:sld>
+</file>
+
+<file path=ppt/slides/slide37.xml><?xml version="1.0" encoding="utf-8"?>
+<p:sld xmlns:a="http://schemas.openxmlformats.org/drawingml/2006/main" xmlns:r="http://schemas.openxmlformats.org/officeDocument/2006/relationships" xmlns:p="http://schemas.openxmlformats.org/presentationml/2006/main">
+  <p:cSld>
+    <p:spTree>
+      <p:nvGrpSpPr>
+        <p:cNvPr id="1" name=""/>
+        <p:cNvGrpSpPr/>
+        <p:nvPr/>
+      </p:nvGrpSpPr>
+      <p:grpSpPr>
+        <a:xfrm>
+          <a:off x="0" y="0"/>
+          <a:ext cx="0" cy="0"/>
+          <a:chOff x="0" y="0"/>
+          <a:chExt cx="0" cy="0"/>
+        </a:xfrm>
+      </p:grpSpPr>
+      <p:sp>
+        <p:nvSpPr>
+          <p:cNvPr id="2" name="Title 1"/>
+          <p:cNvSpPr>
+            <a:spLocks noGrp="1"/>
+          </p:cNvSpPr>
+          <p:nvPr>
+            <p:ph type="title"/>
+          </p:nvPr>
+        </p:nvSpPr>
+        <p:spPr/>
+        <p:txBody>
+          <a:bodyPr/>
+          <a:lstStyle/>
+          <a:p>
+            <a:r>
+              <a:rPr lang="en-US" dirty="0" smtClean="0"/>
+              <a:t>Continue Statement</a:t>
+            </a:r>
+            <a:endParaRPr lang="en-US" dirty="0"/>
+          </a:p>
+        </p:txBody>
+      </p:sp>
+      <p:sp>
+        <p:nvSpPr>
+          <p:cNvPr id="3" name="Content Placeholder 2"/>
+          <p:cNvSpPr>
+            <a:spLocks noGrp="1"/>
+          </p:cNvSpPr>
+          <p:nvPr>
+            <p:ph idx="1"/>
+          </p:nvPr>
+        </p:nvSpPr>
+        <p:spPr/>
+        <p:txBody>
+          <a:bodyPr>
+            <a:normAutofit fontScale="92500"/>
+          </a:bodyPr>
+          <a:lstStyle/>
+          <a:p>
+            <a:pPr algn="just"/>
+            <a:r>
+              <a:rPr lang="en-US" dirty="0" smtClean="0"/>
+              <a:t>The continue statement is used in loop control structure when you need to immediately jump to the next iteration of the loop. </a:t>
+            </a:r>
+          </a:p>
+          <a:p>
+            <a:pPr algn="just"/>
+            <a:r>
+              <a:rPr lang="en-US" dirty="0" smtClean="0"/>
+              <a:t>It can be used with for loop or while loop.</a:t>
+            </a:r>
+          </a:p>
+          <a:p>
+            <a:pPr algn="just"/>
+            <a:r>
+              <a:rPr lang="en-US" dirty="0" smtClean="0"/>
+              <a:t>The Java continue statement is used to continue loop.</a:t>
+            </a:r>
+          </a:p>
+          <a:p>
+            <a:pPr algn="just"/>
+            <a:r>
+              <a:rPr lang="en-US" dirty="0" smtClean="0"/>
+              <a:t>It continues the current flow of the program and skips the remaining code at specified condition.</a:t>
+            </a:r>
+          </a:p>
+        </p:txBody>
+      </p:sp>
+    </p:spTree>
+  </p:cSld>
+  <p:clrMapOvr>
+    <a:masterClrMapping/>
+  </p:clrMapOvr>
+</p:sld>
+</file>
+
+<file path=ppt/slides/slide38.xml><?xml version="1.0" encoding="utf-8"?>
+<p:sld xmlns:a="http://schemas.openxmlformats.org/drawingml/2006/main" xmlns:r="http://schemas.openxmlformats.org/officeDocument/2006/relationships" xmlns:p="http://schemas.openxmlformats.org/presentationml/2006/main">
+  <p:cSld>
+    <p:spTree>
+      <p:nvGrpSpPr>
+        <p:cNvPr id="1" name=""/>
+        <p:cNvGrpSpPr/>
+        <p:nvPr/>
+      </p:nvGrpSpPr>
+      <p:grpSpPr>
+        <a:xfrm>
+          <a:off x="0" y="0"/>
+          <a:ext cx="0" cy="0"/>
+          <a:chOff x="0" y="0"/>
+          <a:chExt cx="0" cy="0"/>
+        </a:xfrm>
+      </p:grpSpPr>
+      <p:sp>
+        <p:nvSpPr>
+          <p:cNvPr id="2" name="Title 1"/>
+          <p:cNvSpPr>
+            <a:spLocks noGrp="1"/>
+          </p:cNvSpPr>
+          <p:nvPr>
+            <p:ph type="title"/>
+          </p:nvPr>
+        </p:nvSpPr>
+        <p:spPr/>
+        <p:txBody>
+          <a:bodyPr/>
+          <a:lstStyle/>
+          <a:p>
+            <a:r>
+              <a:rPr lang="en-US" dirty="0" smtClean="0"/>
+              <a:t>Syntax</a:t>
+            </a:r>
+            <a:endParaRPr lang="en-US" dirty="0"/>
+          </a:p>
+        </p:txBody>
+      </p:sp>
+      <p:sp>
+        <p:nvSpPr>
+          <p:cNvPr id="3" name="Content Placeholder 2"/>
+          <p:cNvSpPr>
+            <a:spLocks noGrp="1"/>
+          </p:cNvSpPr>
+          <p:nvPr>
+            <p:ph idx="1"/>
+          </p:nvPr>
+        </p:nvSpPr>
+        <p:spPr>
+          <a:xfrm>
+            <a:off x="457200" y="1600201"/>
+            <a:ext cx="8229600" cy="2971800"/>
+          </a:xfrm>
+        </p:spPr>
+        <p:txBody>
+          <a:bodyPr/>
+          <a:lstStyle/>
+          <a:p>
+            <a:pPr>
+              <a:buNone/>
+            </a:pPr>
+            <a:r>
+              <a:rPr lang="en-US" dirty="0" smtClean="0">
+                <a:latin typeface="Consolas" pitchFamily="49" charset="0"/>
+              </a:rPr>
+              <a:t>loop {</a:t>
+            </a:r>
+          </a:p>
+          <a:p>
+            <a:pPr>
+              <a:buNone/>
+            </a:pPr>
+            <a:r>
+              <a:rPr lang="en-US" dirty="0" smtClean="0">
+                <a:latin typeface="Consolas" pitchFamily="49" charset="0"/>
+              </a:rPr>
+              <a:t>//block of code [stage 1]</a:t>
+            </a:r>
+          </a:p>
+          <a:p>
+            <a:pPr>
+              <a:buNone/>
+            </a:pPr>
+            <a:r>
+              <a:rPr lang="en-US" dirty="0" smtClean="0">
+                <a:solidFill>
+                  <a:srgbClr val="FF0000"/>
+                </a:solidFill>
+                <a:latin typeface="Consolas" pitchFamily="49" charset="0"/>
+              </a:rPr>
+              <a:t>continue</a:t>
+            </a:r>
+            <a:r>
+              <a:rPr lang="en-US" dirty="0" smtClean="0">
+                <a:latin typeface="Consolas" pitchFamily="49" charset="0"/>
+              </a:rPr>
+              <a:t>;</a:t>
+            </a:r>
+          </a:p>
+          <a:p>
+            <a:pPr>
+              <a:buNone/>
+            </a:pPr>
+            <a:r>
+              <a:rPr lang="en-US" dirty="0" smtClean="0">
+                <a:latin typeface="Consolas" pitchFamily="49" charset="0"/>
+              </a:rPr>
+              <a:t>//block of code [stage 2]</a:t>
+            </a:r>
+          </a:p>
+          <a:p>
+            <a:pPr>
+              <a:buNone/>
+            </a:pPr>
+            <a:r>
+              <a:rPr lang="en-US" dirty="0" smtClean="0">
+                <a:latin typeface="Consolas" pitchFamily="49" charset="0"/>
+              </a:rPr>
+              <a:t>}</a:t>
+            </a:r>
+            <a:endParaRPr lang="en-US" dirty="0">
+              <a:latin typeface="Consolas" pitchFamily="49" charset="0"/>
+            </a:endParaRPr>
+          </a:p>
+        </p:txBody>
+      </p:sp>
+      <p:sp>
+        <p:nvSpPr>
+          <p:cNvPr id="4" name="Content Placeholder 2"/>
+          <p:cNvSpPr txBox="1">
+            <a:spLocks/>
+          </p:cNvSpPr>
+          <p:nvPr/>
+        </p:nvSpPr>
+        <p:spPr>
+          <a:xfrm>
+            <a:off x="609600" y="4876800"/>
+            <a:ext cx="8077200" cy="1371600"/>
+          </a:xfrm>
+          <a:prstGeom prst="rect">
+            <a:avLst/>
+          </a:prstGeom>
+        </p:spPr>
+        <p:txBody>
+          <a:bodyPr vert="horz" lIns="91440" tIns="45720" rIns="91440" bIns="45720" rtlCol="0">
+            <a:normAutofit fontScale="92500" lnSpcReduction="20000"/>
+          </a:bodyPr>
+          <a:lstStyle/>
+          <a:p>
+            <a:pPr marL="342900" marR="0" lvl="0" indent="-342900" algn="l" defTabSz="914400" rtl="0" eaLnBrk="1" fontAlgn="auto" latinLnBrk="0" hangingPunct="1">
+              <a:lnSpc>
+                <a:spcPct val="100000"/>
+              </a:lnSpc>
+              <a:spcBef>
+                <a:spcPct val="20000"/>
+              </a:spcBef>
+              <a:spcAft>
+                <a:spcPts val="0"/>
+              </a:spcAft>
+              <a:buClrTx/>
+              <a:buSzTx/>
+              <a:buFont typeface="Arial" pitchFamily="34" charset="0"/>
+              <a:buChar char="•"/>
+              <a:tabLst/>
+              <a:defRPr/>
+            </a:pPr>
+            <a:r>
+              <a:rPr kumimoji="0" lang="en-US" sz="3200" b="0" i="0" u="none" strike="noStrike" kern="1200" cap="none" spc="0" normalizeH="0" baseline="0" noProof="0" dirty="0" smtClean="0">
+                <a:ln>
+                  <a:noFill/>
+                </a:ln>
+                <a:solidFill>
+                  <a:schemeClr val="tx1"/>
+                </a:solidFill>
+                <a:effectLst/>
+                <a:uLnTx/>
+                <a:uFillTx/>
+                <a:latin typeface="Monotype Corsiva" pitchFamily="66" charset="0"/>
+              </a:rPr>
+              <a:t>Stage</a:t>
+            </a:r>
+            <a:r>
+              <a:rPr kumimoji="0" lang="en-US" sz="3200" b="0" i="0" u="none" strike="noStrike" kern="1200" cap="none" spc="0" normalizeH="0" noProof="0" dirty="0" smtClean="0">
+                <a:ln>
+                  <a:noFill/>
+                </a:ln>
+                <a:solidFill>
+                  <a:schemeClr val="tx1"/>
+                </a:solidFill>
+                <a:effectLst/>
+                <a:uLnTx/>
+                <a:uFillTx/>
+                <a:latin typeface="Monotype Corsiva" pitchFamily="66" charset="0"/>
+              </a:rPr>
+              <a:t> 2 block will not execute due to the encounter of continue.</a:t>
+            </a:r>
+          </a:p>
+          <a:p>
+            <a:pPr marL="342900" marR="0" lvl="0" indent="-342900" algn="l" defTabSz="914400" rtl="0" eaLnBrk="1" fontAlgn="auto" latinLnBrk="0" hangingPunct="1">
+              <a:lnSpc>
+                <a:spcPct val="100000"/>
+              </a:lnSpc>
+              <a:spcBef>
+                <a:spcPct val="20000"/>
+              </a:spcBef>
+              <a:spcAft>
+                <a:spcPts val="0"/>
+              </a:spcAft>
+              <a:buClrTx/>
+              <a:buSzTx/>
+              <a:buFont typeface="Arial" pitchFamily="34" charset="0"/>
+              <a:buChar char="•"/>
+              <a:tabLst/>
+              <a:defRPr/>
+            </a:pPr>
+            <a:r>
+              <a:rPr lang="en-US" sz="3200" baseline="0" dirty="0" smtClean="0">
+                <a:latin typeface="Monotype Corsiva" pitchFamily="66" charset="0"/>
+              </a:rPr>
+              <a:t>It</a:t>
+            </a:r>
+            <a:r>
+              <a:rPr lang="en-US" sz="3200" dirty="0" smtClean="0">
+                <a:latin typeface="Monotype Corsiva" pitchFamily="66" charset="0"/>
+              </a:rPr>
+              <a:t> simply moves to begging of the loop.</a:t>
+            </a:r>
+            <a:endParaRPr kumimoji="0" lang="en-US" sz="3200" b="0" i="0" u="none" strike="noStrike" kern="1200" cap="none" spc="0" normalizeH="0" baseline="0" noProof="0" dirty="0">
+              <a:ln>
+                <a:noFill/>
+              </a:ln>
+              <a:solidFill>
+                <a:schemeClr val="tx1"/>
+              </a:solidFill>
+              <a:effectLst/>
+              <a:uLnTx/>
+              <a:uFillTx/>
+              <a:latin typeface="Monotype Corsiva" pitchFamily="66" charset="0"/>
+            </a:endParaRPr>
+          </a:p>
+        </p:txBody>
+      </p:sp>
+    </p:spTree>
+  </p:cSld>
+  <p:clrMapOvr>
+    <a:masterClrMapping/>
+  </p:clrMapOvr>
+</p:sld>
+</file>
+
+<file path=ppt/slides/slide39.xml><?xml version="1.0" encoding="utf-8"?>
+<p:sld xmlns:a="http://schemas.openxmlformats.org/drawingml/2006/main" xmlns:r="http://schemas.openxmlformats.org/officeDocument/2006/relationships" xmlns:p="http://schemas.openxmlformats.org/presentationml/2006/main">
+  <p:cSld>
+    <p:spTree>
+      <p:nvGrpSpPr>
+        <p:cNvPr id="1" name=""/>
+        <p:cNvGrpSpPr/>
+        <p:nvPr/>
+      </p:nvGrpSpPr>
+      <p:grpSpPr>
+        <a:xfrm>
+          <a:off x="0" y="0"/>
+          <a:ext cx="0" cy="0"/>
+          <a:chOff x="0" y="0"/>
+          <a:chExt cx="0" cy="0"/>
+        </a:xfrm>
+      </p:grpSpPr>
+      <p:sp>
+        <p:nvSpPr>
+          <p:cNvPr id="2" name="Title 1"/>
+          <p:cNvSpPr>
+            <a:spLocks noGrp="1"/>
+          </p:cNvSpPr>
+          <p:nvPr>
+            <p:ph type="title"/>
+          </p:nvPr>
+        </p:nvSpPr>
+        <p:spPr/>
+        <p:txBody>
+          <a:bodyPr/>
+          <a:lstStyle/>
+          <a:p>
+            <a:r>
+              <a:rPr lang="en-US" dirty="0" smtClean="0"/>
+              <a:t>Example</a:t>
+            </a:r>
+            <a:endParaRPr lang="en-US" dirty="0"/>
+          </a:p>
+        </p:txBody>
+      </p:sp>
+      <p:pic>
+        <p:nvPicPr>
+          <p:cNvPr id="1026" name="Picture 2"/>
+          <p:cNvPicPr>
+            <a:picLocks noChangeAspect="1" noChangeArrowheads="1"/>
+          </p:cNvPicPr>
+          <p:nvPr/>
+        </p:nvPicPr>
+        <p:blipFill>
+          <a:blip r:embed="rId2"/>
+          <a:srcRect/>
+          <a:stretch>
+            <a:fillRect/>
+          </a:stretch>
+        </p:blipFill>
+        <p:spPr bwMode="auto">
+          <a:xfrm>
+            <a:off x="1295400" y="1676400"/>
+            <a:ext cx="6705600" cy="4910853"/>
+          </a:xfrm>
+          <a:prstGeom prst="rect">
+            <a:avLst/>
+          </a:prstGeom>
+          <a:noFill/>
+          <a:ln w="9525">
+            <a:noFill/>
+            <a:miter lim="800000"/>
+            <a:headEnd/>
+            <a:tailEnd/>
+          </a:ln>
+          <a:effectLst/>
+        </p:spPr>
+      </p:pic>
+    </p:spTree>
+  </p:cSld>
+  <p:clrMapOvr>
+    <a:masterClrMapping/>
+  </p:clrMapOvr>
+</p:sld>
+</file>
+
 <file path=ppt/slides/slide4.xml><?xml version="1.0" encoding="utf-8"?>
 <p:sld xmlns:a="http://schemas.openxmlformats.org/drawingml/2006/main" xmlns:r="http://schemas.openxmlformats.org/officeDocument/2006/relationships" xmlns:p="http://schemas.openxmlformats.org/presentationml/2006/main">
   <p:cSld>
@@ -7965,17 +9919,1039 @@
           <a:p>
             <a:r>
               <a:rPr lang="en-US" dirty="0" smtClean="0"/>
-              <a:t>If condition passed if block is executed otherwise else block is </a:t>
+              <a:t>If condition passed if block is executed otherwise else block is executed.</a:t>
+            </a:r>
+            <a:endParaRPr lang="en-US" dirty="0"/>
+          </a:p>
+        </p:txBody>
+      </p:sp>
+    </p:spTree>
+  </p:cSld>
+  <p:clrMapOvr>
+    <a:masterClrMapping/>
+  </p:clrMapOvr>
+  <p:timing>
+    <p:tnLst>
+      <p:par>
+        <p:cTn id="1" dur="indefinite" restart="never" nodeType="tmRoot"/>
+      </p:par>
+    </p:tnLst>
+  </p:timing>
+</p:sld>
+</file>
+
+<file path=ppt/slides/slide40.xml><?xml version="1.0" encoding="utf-8"?>
+<p:sld xmlns:a="http://schemas.openxmlformats.org/drawingml/2006/main" xmlns:r="http://schemas.openxmlformats.org/officeDocument/2006/relationships" xmlns:p="http://schemas.openxmlformats.org/presentationml/2006/main">
+  <p:cSld>
+    <p:spTree>
+      <p:nvGrpSpPr>
+        <p:cNvPr id="1" name=""/>
+        <p:cNvGrpSpPr/>
+        <p:nvPr/>
+      </p:nvGrpSpPr>
+      <p:grpSpPr>
+        <a:xfrm>
+          <a:off x="0" y="0"/>
+          <a:ext cx="0" cy="0"/>
+          <a:chOff x="0" y="0"/>
+          <a:chExt cx="0" cy="0"/>
+        </a:xfrm>
+      </p:grpSpPr>
+      <p:sp>
+        <p:nvSpPr>
+          <p:cNvPr id="2" name="Title 1"/>
+          <p:cNvSpPr>
+            <a:spLocks noGrp="1"/>
+          </p:cNvSpPr>
+          <p:nvPr>
+            <p:ph type="title"/>
+          </p:nvPr>
+        </p:nvSpPr>
+        <p:spPr/>
+        <p:txBody>
+          <a:bodyPr/>
+          <a:lstStyle/>
+          <a:p>
+            <a:r>
+              <a:rPr lang="en-US" dirty="0" smtClean="0"/>
+              <a:t>Explanation</a:t>
+            </a:r>
+            <a:endParaRPr lang="en-US" dirty="0"/>
+          </a:p>
+        </p:txBody>
+      </p:sp>
+      <p:sp>
+        <p:nvSpPr>
+          <p:cNvPr id="3" name="Content Placeholder 2"/>
+          <p:cNvSpPr>
+            <a:spLocks noGrp="1"/>
+          </p:cNvSpPr>
+          <p:nvPr>
+            <p:ph idx="1"/>
+          </p:nvPr>
+        </p:nvSpPr>
+        <p:spPr/>
+        <p:txBody>
+          <a:bodyPr>
+            <a:normAutofit fontScale="92500" lnSpcReduction="10000"/>
+          </a:bodyPr>
+          <a:lstStyle/>
+          <a:p>
+            <a:pPr algn="just"/>
+            <a:r>
+              <a:rPr lang="en-US" dirty="0" smtClean="0"/>
+              <a:t>Program try to print the numbers from 0 to 4.</a:t>
+            </a:r>
+          </a:p>
+          <a:p>
+            <a:pPr algn="just"/>
+            <a:r>
+              <a:rPr lang="en-US" dirty="0" smtClean="0"/>
+              <a:t>Every time loop executes the current value of </a:t>
             </a:r>
             <a:r>
               <a:rPr lang="en-US" dirty="0" err="1" smtClean="0"/>
-              <a:t>execued</a:t>
+              <a:t>i</a:t>
             </a:r>
             <a:r>
               <a:rPr lang="en-US" dirty="0" smtClean="0"/>
-              <a:t>.</a:t>
+              <a:t> is printed.</a:t>
+            </a:r>
+          </a:p>
+          <a:p>
+            <a:pPr algn="just"/>
+            <a:r>
+              <a:rPr lang="en-US" dirty="0" smtClean="0"/>
+              <a:t>While we encountering i value is 3.</a:t>
+            </a:r>
+          </a:p>
+          <a:p>
+            <a:pPr lvl="1" algn="just"/>
+            <a:r>
+              <a:rPr lang="en-US" dirty="0" smtClean="0"/>
+              <a:t> String “Three” is printed instead of Number 3.</a:t>
+            </a:r>
+          </a:p>
+          <a:p>
+            <a:pPr lvl="1" algn="just"/>
+            <a:r>
+              <a:rPr lang="en-US" dirty="0" smtClean="0"/>
+              <a:t>Even consecutive statements [Line 12] has ready print number 3 it is ignored by continue.</a:t>
+            </a:r>
+          </a:p>
+          <a:p>
+            <a:pPr lvl="1" algn="just"/>
+            <a:r>
+              <a:rPr lang="en-US" dirty="0" smtClean="0"/>
+              <a:t>Continue statement moves the control to the beginning of the loop so the remaining statements are ignored for that iteration. </a:t>
             </a:r>
             <a:endParaRPr lang="en-US" dirty="0"/>
+          </a:p>
+        </p:txBody>
+      </p:sp>
+    </p:spTree>
+  </p:cSld>
+  <p:clrMapOvr>
+    <a:masterClrMapping/>
+  </p:clrMapOvr>
+</p:sld>
+</file>
+
+<file path=ppt/slides/slide41.xml><?xml version="1.0" encoding="utf-8"?>
+<p:sld xmlns:a="http://schemas.openxmlformats.org/drawingml/2006/main" xmlns:r="http://schemas.openxmlformats.org/officeDocument/2006/relationships" xmlns:p="http://schemas.openxmlformats.org/presentationml/2006/main">
+  <p:cSld>
+    <p:spTree>
+      <p:nvGrpSpPr>
+        <p:cNvPr id="1" name=""/>
+        <p:cNvGrpSpPr/>
+        <p:nvPr/>
+      </p:nvGrpSpPr>
+      <p:grpSpPr>
+        <a:xfrm>
+          <a:off x="0" y="0"/>
+          <a:ext cx="0" cy="0"/>
+          <a:chOff x="0" y="0"/>
+          <a:chExt cx="0" cy="0"/>
+        </a:xfrm>
+      </p:grpSpPr>
+      <p:sp>
+        <p:nvSpPr>
+          <p:cNvPr id="2" name="Title 1"/>
+          <p:cNvSpPr>
+            <a:spLocks noGrp="1"/>
+          </p:cNvSpPr>
+          <p:nvPr>
+            <p:ph type="title"/>
+          </p:nvPr>
+        </p:nvSpPr>
+        <p:spPr/>
+        <p:txBody>
+          <a:bodyPr/>
+          <a:lstStyle/>
+          <a:p>
+            <a:r>
+              <a:rPr lang="en-US" dirty="0" smtClean="0"/>
+              <a:t>Break Statement</a:t>
+            </a:r>
+            <a:endParaRPr lang="en-US" dirty="0"/>
+          </a:p>
+        </p:txBody>
+      </p:sp>
+      <p:sp>
+        <p:nvSpPr>
+          <p:cNvPr id="3" name="Content Placeholder 2"/>
+          <p:cNvSpPr>
+            <a:spLocks noGrp="1"/>
+          </p:cNvSpPr>
+          <p:nvPr>
+            <p:ph idx="1"/>
+          </p:nvPr>
+        </p:nvSpPr>
+        <p:spPr/>
+        <p:txBody>
+          <a:bodyPr>
+            <a:normAutofit fontScale="92500"/>
+          </a:bodyPr>
+          <a:lstStyle/>
+          <a:p>
+            <a:pPr algn="just"/>
+            <a:r>
+              <a:rPr lang="en-US" dirty="0" smtClean="0"/>
+              <a:t>It is used to break the flow and moves out the control from current block.</a:t>
+            </a:r>
+          </a:p>
+          <a:p>
+            <a:pPr algn="just"/>
+            <a:r>
+              <a:rPr lang="en-US" dirty="0" smtClean="0"/>
+              <a:t>When the break statement is encountered inside a loop, the loop is immediately terminated and the program control resumes at the next statement following the loop.</a:t>
+            </a:r>
+          </a:p>
+          <a:p>
+            <a:pPr algn="just"/>
+            <a:r>
+              <a:rPr lang="en-US" dirty="0" smtClean="0"/>
+              <a:t>It can be used to terminate a case in the switch statement (covered in the next chapter).</a:t>
+            </a:r>
+          </a:p>
+        </p:txBody>
+      </p:sp>
+    </p:spTree>
+  </p:cSld>
+  <p:clrMapOvr>
+    <a:masterClrMapping/>
+  </p:clrMapOvr>
+</p:sld>
+</file>
+
+<file path=ppt/slides/slide42.xml><?xml version="1.0" encoding="utf-8"?>
+<p:sld xmlns:a="http://schemas.openxmlformats.org/drawingml/2006/main" xmlns:r="http://schemas.openxmlformats.org/officeDocument/2006/relationships" xmlns:p="http://schemas.openxmlformats.org/presentationml/2006/main">
+  <p:cSld>
+    <p:spTree>
+      <p:nvGrpSpPr>
+        <p:cNvPr id="1" name=""/>
+        <p:cNvGrpSpPr/>
+        <p:nvPr/>
+      </p:nvGrpSpPr>
+      <p:grpSpPr>
+        <a:xfrm>
+          <a:off x="0" y="0"/>
+          <a:ext cx="0" cy="0"/>
+          <a:chOff x="0" y="0"/>
+          <a:chExt cx="0" cy="0"/>
+        </a:xfrm>
+      </p:grpSpPr>
+      <p:sp>
+        <p:nvSpPr>
+          <p:cNvPr id="2" name="Title 1"/>
+          <p:cNvSpPr>
+            <a:spLocks noGrp="1"/>
+          </p:cNvSpPr>
+          <p:nvPr>
+            <p:ph type="title"/>
+          </p:nvPr>
+        </p:nvSpPr>
+        <p:spPr/>
+        <p:txBody>
+          <a:bodyPr/>
+          <a:lstStyle/>
+          <a:p>
+            <a:r>
+              <a:rPr lang="en-US" dirty="0" smtClean="0"/>
+              <a:t>Syntax</a:t>
+            </a:r>
+            <a:endParaRPr lang="en-US" dirty="0"/>
+          </a:p>
+        </p:txBody>
+      </p:sp>
+      <p:sp>
+        <p:nvSpPr>
+          <p:cNvPr id="3" name="Content Placeholder 2"/>
+          <p:cNvSpPr>
+            <a:spLocks noGrp="1"/>
+          </p:cNvSpPr>
+          <p:nvPr>
+            <p:ph idx="1"/>
+          </p:nvPr>
+        </p:nvSpPr>
+        <p:spPr>
+          <a:xfrm>
+            <a:off x="457200" y="1600201"/>
+            <a:ext cx="8229600" cy="2971800"/>
+          </a:xfrm>
+        </p:spPr>
+        <p:txBody>
+          <a:bodyPr/>
+          <a:lstStyle/>
+          <a:p>
+            <a:pPr>
+              <a:buNone/>
+            </a:pPr>
+            <a:r>
+              <a:rPr lang="en-US" dirty="0" smtClean="0">
+                <a:latin typeface="Consolas" pitchFamily="49" charset="0"/>
+              </a:rPr>
+              <a:t>loop {</a:t>
+            </a:r>
+          </a:p>
+          <a:p>
+            <a:pPr>
+              <a:buNone/>
+            </a:pPr>
+            <a:r>
+              <a:rPr lang="en-US" dirty="0" smtClean="0">
+                <a:latin typeface="Consolas" pitchFamily="49" charset="0"/>
+              </a:rPr>
+              <a:t>//block of code [stage 1]</a:t>
+            </a:r>
+          </a:p>
+          <a:p>
+            <a:pPr>
+              <a:buNone/>
+            </a:pPr>
+            <a:r>
+              <a:rPr lang="en-US" dirty="0" smtClean="0">
+                <a:solidFill>
+                  <a:srgbClr val="FF0000"/>
+                </a:solidFill>
+                <a:latin typeface="Consolas" pitchFamily="49" charset="0"/>
+              </a:rPr>
+              <a:t>break</a:t>
+            </a:r>
+            <a:r>
+              <a:rPr lang="en-US" dirty="0" smtClean="0">
+                <a:latin typeface="Consolas" pitchFamily="49" charset="0"/>
+              </a:rPr>
+              <a:t>;</a:t>
+            </a:r>
+          </a:p>
+          <a:p>
+            <a:pPr>
+              <a:buNone/>
+            </a:pPr>
+            <a:r>
+              <a:rPr lang="en-US" dirty="0" smtClean="0">
+                <a:latin typeface="Consolas" pitchFamily="49" charset="0"/>
+              </a:rPr>
+              <a:t>//block of code [stage 2]</a:t>
+            </a:r>
+          </a:p>
+          <a:p>
+            <a:pPr>
+              <a:buNone/>
+            </a:pPr>
+            <a:r>
+              <a:rPr lang="en-US" dirty="0" smtClean="0">
+                <a:latin typeface="Consolas" pitchFamily="49" charset="0"/>
+              </a:rPr>
+              <a:t>}</a:t>
+            </a:r>
+            <a:endParaRPr lang="en-US" dirty="0">
+              <a:latin typeface="Consolas" pitchFamily="49" charset="0"/>
+            </a:endParaRPr>
+          </a:p>
+        </p:txBody>
+      </p:sp>
+      <p:sp>
+        <p:nvSpPr>
+          <p:cNvPr id="4" name="Content Placeholder 2"/>
+          <p:cNvSpPr txBox="1">
+            <a:spLocks/>
+          </p:cNvSpPr>
+          <p:nvPr/>
+        </p:nvSpPr>
+        <p:spPr>
+          <a:xfrm>
+            <a:off x="609600" y="4876800"/>
+            <a:ext cx="8077200" cy="1371600"/>
+          </a:xfrm>
+          <a:prstGeom prst="rect">
+            <a:avLst/>
+          </a:prstGeom>
+        </p:spPr>
+        <p:txBody>
+          <a:bodyPr vert="horz" lIns="91440" tIns="45720" rIns="91440" bIns="45720" rtlCol="0">
+            <a:normAutofit fontScale="92500" lnSpcReduction="20000"/>
+          </a:bodyPr>
+          <a:lstStyle/>
+          <a:p>
+            <a:pPr marL="342900" marR="0" lvl="0" indent="-342900" algn="l" defTabSz="914400" rtl="0" eaLnBrk="1" fontAlgn="auto" latinLnBrk="0" hangingPunct="1">
+              <a:lnSpc>
+                <a:spcPct val="100000"/>
+              </a:lnSpc>
+              <a:spcBef>
+                <a:spcPct val="20000"/>
+              </a:spcBef>
+              <a:spcAft>
+                <a:spcPts val="0"/>
+              </a:spcAft>
+              <a:buClrTx/>
+              <a:buSzTx/>
+              <a:buFont typeface="Arial" pitchFamily="34" charset="0"/>
+              <a:buChar char="•"/>
+              <a:tabLst/>
+              <a:defRPr/>
+            </a:pPr>
+            <a:r>
+              <a:rPr kumimoji="0" lang="en-US" sz="3200" b="0" i="0" u="none" strike="noStrike" kern="1200" cap="none" spc="0" normalizeH="0" baseline="0" noProof="0" dirty="0" smtClean="0">
+                <a:ln>
+                  <a:noFill/>
+                </a:ln>
+                <a:solidFill>
+                  <a:schemeClr val="tx1"/>
+                </a:solidFill>
+                <a:effectLst/>
+                <a:uLnTx/>
+                <a:uFillTx/>
+                <a:latin typeface="Monotype Corsiva" pitchFamily="66" charset="0"/>
+              </a:rPr>
+              <a:t>Stage</a:t>
+            </a:r>
+            <a:r>
+              <a:rPr kumimoji="0" lang="en-US" sz="3200" b="0" i="0" u="none" strike="noStrike" kern="1200" cap="none" spc="0" normalizeH="0" noProof="0" dirty="0" smtClean="0">
+                <a:ln>
+                  <a:noFill/>
+                </a:ln>
+                <a:solidFill>
+                  <a:schemeClr val="tx1"/>
+                </a:solidFill>
+                <a:effectLst/>
+                <a:uLnTx/>
+                <a:uFillTx/>
+                <a:latin typeface="Monotype Corsiva" pitchFamily="66" charset="0"/>
+              </a:rPr>
+              <a:t> 2 block will not execute due to the encounter of break.</a:t>
+            </a:r>
+          </a:p>
+          <a:p>
+            <a:pPr marL="342900" marR="0" lvl="0" indent="-342900" algn="l" defTabSz="914400" rtl="0" eaLnBrk="1" fontAlgn="auto" latinLnBrk="0" hangingPunct="1">
+              <a:lnSpc>
+                <a:spcPct val="100000"/>
+              </a:lnSpc>
+              <a:spcBef>
+                <a:spcPct val="20000"/>
+              </a:spcBef>
+              <a:spcAft>
+                <a:spcPts val="0"/>
+              </a:spcAft>
+              <a:buClrTx/>
+              <a:buSzTx/>
+              <a:buFont typeface="Arial" pitchFamily="34" charset="0"/>
+              <a:buChar char="•"/>
+              <a:tabLst/>
+              <a:defRPr/>
+            </a:pPr>
+            <a:r>
+              <a:rPr lang="en-US" sz="3200" baseline="0" dirty="0" smtClean="0">
+                <a:latin typeface="Monotype Corsiva" pitchFamily="66" charset="0"/>
+              </a:rPr>
+              <a:t>It</a:t>
+            </a:r>
+            <a:r>
+              <a:rPr lang="en-US" sz="3200" dirty="0" smtClean="0">
+                <a:latin typeface="Monotype Corsiva" pitchFamily="66" charset="0"/>
+              </a:rPr>
+              <a:t> simply breaks the loop and there is no more iterations.</a:t>
+            </a:r>
+            <a:endParaRPr kumimoji="0" lang="en-US" sz="3200" b="0" i="0" u="none" strike="noStrike" kern="1200" cap="none" spc="0" normalizeH="0" baseline="0" noProof="0" dirty="0">
+              <a:ln>
+                <a:noFill/>
+              </a:ln>
+              <a:solidFill>
+                <a:schemeClr val="tx1"/>
+              </a:solidFill>
+              <a:effectLst/>
+              <a:uLnTx/>
+              <a:uFillTx/>
+              <a:latin typeface="Monotype Corsiva" pitchFamily="66" charset="0"/>
+            </a:endParaRPr>
+          </a:p>
+        </p:txBody>
+      </p:sp>
+    </p:spTree>
+  </p:cSld>
+  <p:clrMapOvr>
+    <a:masterClrMapping/>
+  </p:clrMapOvr>
+</p:sld>
+</file>
+
+<file path=ppt/slides/slide43.xml><?xml version="1.0" encoding="utf-8"?>
+<p:sld xmlns:a="http://schemas.openxmlformats.org/drawingml/2006/main" xmlns:r="http://schemas.openxmlformats.org/officeDocument/2006/relationships" xmlns:p="http://schemas.openxmlformats.org/presentationml/2006/main">
+  <p:cSld>
+    <p:spTree>
+      <p:nvGrpSpPr>
+        <p:cNvPr id="1" name=""/>
+        <p:cNvGrpSpPr/>
+        <p:nvPr/>
+      </p:nvGrpSpPr>
+      <p:grpSpPr>
+        <a:xfrm>
+          <a:off x="0" y="0"/>
+          <a:ext cx="0" cy="0"/>
+          <a:chOff x="0" y="0"/>
+          <a:chExt cx="0" cy="0"/>
+        </a:xfrm>
+      </p:grpSpPr>
+      <p:sp>
+        <p:nvSpPr>
+          <p:cNvPr id="2" name="Title 1"/>
+          <p:cNvSpPr>
+            <a:spLocks noGrp="1"/>
+          </p:cNvSpPr>
+          <p:nvPr>
+            <p:ph type="title"/>
+          </p:nvPr>
+        </p:nvSpPr>
+        <p:spPr/>
+        <p:txBody>
+          <a:bodyPr/>
+          <a:lstStyle/>
+          <a:p>
+            <a:r>
+              <a:rPr lang="en-US" dirty="0" smtClean="0"/>
+              <a:t>Example</a:t>
+            </a:r>
+            <a:endParaRPr lang="en-US" dirty="0"/>
+          </a:p>
+        </p:txBody>
+      </p:sp>
+      <p:pic>
+        <p:nvPicPr>
+          <p:cNvPr id="2050" name="Picture 2"/>
+          <p:cNvPicPr>
+            <a:picLocks noChangeAspect="1" noChangeArrowheads="1"/>
+          </p:cNvPicPr>
+          <p:nvPr/>
+        </p:nvPicPr>
+        <p:blipFill>
+          <a:blip r:embed="rId2"/>
+          <a:srcRect/>
+          <a:stretch>
+            <a:fillRect/>
+          </a:stretch>
+        </p:blipFill>
+        <p:spPr bwMode="auto">
+          <a:xfrm>
+            <a:off x="1295400" y="1524000"/>
+            <a:ext cx="6324600" cy="5051532"/>
+          </a:xfrm>
+          <a:prstGeom prst="rect">
+            <a:avLst/>
+          </a:prstGeom>
+          <a:noFill/>
+          <a:ln w="9525">
+            <a:noFill/>
+            <a:miter lim="800000"/>
+            <a:headEnd/>
+            <a:tailEnd/>
+          </a:ln>
+          <a:effectLst/>
+        </p:spPr>
+      </p:pic>
+    </p:spTree>
+  </p:cSld>
+  <p:clrMapOvr>
+    <a:masterClrMapping/>
+  </p:clrMapOvr>
+</p:sld>
+</file>
+
+<file path=ppt/slides/slide44.xml><?xml version="1.0" encoding="utf-8"?>
+<p:sld xmlns:a="http://schemas.openxmlformats.org/drawingml/2006/main" xmlns:r="http://schemas.openxmlformats.org/officeDocument/2006/relationships" xmlns:p="http://schemas.openxmlformats.org/presentationml/2006/main">
+  <p:cSld>
+    <p:spTree>
+      <p:nvGrpSpPr>
+        <p:cNvPr id="1" name=""/>
+        <p:cNvGrpSpPr/>
+        <p:nvPr/>
+      </p:nvGrpSpPr>
+      <p:grpSpPr>
+        <a:xfrm>
+          <a:off x="0" y="0"/>
+          <a:ext cx="0" cy="0"/>
+          <a:chOff x="0" y="0"/>
+          <a:chExt cx="0" cy="0"/>
+        </a:xfrm>
+      </p:grpSpPr>
+      <p:sp>
+        <p:nvSpPr>
+          <p:cNvPr id="2" name="Title 1"/>
+          <p:cNvSpPr>
+            <a:spLocks noGrp="1"/>
+          </p:cNvSpPr>
+          <p:nvPr>
+            <p:ph type="title"/>
+          </p:nvPr>
+        </p:nvSpPr>
+        <p:spPr/>
+        <p:txBody>
+          <a:bodyPr/>
+          <a:lstStyle/>
+          <a:p>
+            <a:r>
+              <a:rPr lang="en-US" dirty="0" smtClean="0"/>
+              <a:t>Explanation</a:t>
+            </a:r>
+            <a:endParaRPr lang="en-US" dirty="0"/>
+          </a:p>
+        </p:txBody>
+      </p:sp>
+      <p:sp>
+        <p:nvSpPr>
+          <p:cNvPr id="3" name="Content Placeholder 2"/>
+          <p:cNvSpPr>
+            <a:spLocks noGrp="1"/>
+          </p:cNvSpPr>
+          <p:nvPr>
+            <p:ph idx="1"/>
+          </p:nvPr>
+        </p:nvSpPr>
+        <p:spPr/>
+        <p:txBody>
+          <a:bodyPr>
+            <a:normAutofit fontScale="92500" lnSpcReduction="10000"/>
+          </a:bodyPr>
+          <a:lstStyle/>
+          <a:p>
+            <a:pPr algn="just"/>
+            <a:r>
+              <a:rPr lang="en-US" dirty="0" smtClean="0"/>
+              <a:t>Program try to print the numbers from 0 to 4.</a:t>
+            </a:r>
+          </a:p>
+          <a:p>
+            <a:pPr algn="just"/>
+            <a:r>
+              <a:rPr lang="en-US" dirty="0" smtClean="0"/>
+              <a:t>Every time loop executes the current value of </a:t>
+            </a:r>
+            <a:r>
+              <a:rPr lang="en-US" dirty="0" err="1" smtClean="0"/>
+              <a:t>i</a:t>
+            </a:r>
+            <a:r>
+              <a:rPr lang="en-US" dirty="0" smtClean="0"/>
+              <a:t> is printed.</a:t>
+            </a:r>
+          </a:p>
+          <a:p>
+            <a:pPr algn="just"/>
+            <a:r>
+              <a:rPr lang="en-US" dirty="0" smtClean="0"/>
+              <a:t>While we encountering i value is 3.</a:t>
+            </a:r>
+          </a:p>
+          <a:p>
+            <a:pPr lvl="1" algn="just"/>
+            <a:r>
+              <a:rPr lang="en-US" dirty="0" smtClean="0"/>
+              <a:t>It prints “Loop Terminated”.</a:t>
+            </a:r>
+          </a:p>
+          <a:p>
+            <a:pPr lvl="1" algn="just"/>
+            <a:r>
+              <a:rPr lang="en-US" dirty="0" smtClean="0"/>
+              <a:t>Break Statement is encountered so the loop is terminated immediately.</a:t>
+            </a:r>
+          </a:p>
+          <a:p>
+            <a:pPr lvl="1" algn="just"/>
+            <a:r>
+              <a:rPr lang="en-US" dirty="0" smtClean="0"/>
+              <a:t>Even 1 more iterations is available to complete total number of iterations expected but loop is terminated due to break statement.</a:t>
+            </a:r>
+            <a:endParaRPr lang="en-US" dirty="0"/>
+          </a:p>
+        </p:txBody>
+      </p:sp>
+    </p:spTree>
+  </p:cSld>
+  <p:clrMapOvr>
+    <a:masterClrMapping/>
+  </p:clrMapOvr>
+</p:sld>
+</file>
+
+<file path=ppt/slides/slide45.xml><?xml version="1.0" encoding="utf-8"?>
+<p:sld xmlns:a="http://schemas.openxmlformats.org/drawingml/2006/main" xmlns:r="http://schemas.openxmlformats.org/officeDocument/2006/relationships" xmlns:p="http://schemas.openxmlformats.org/presentationml/2006/main">
+  <p:cSld>
+    <p:spTree>
+      <p:nvGrpSpPr>
+        <p:cNvPr id="1" name=""/>
+        <p:cNvGrpSpPr/>
+        <p:nvPr/>
+      </p:nvGrpSpPr>
+      <p:grpSpPr>
+        <a:xfrm>
+          <a:off x="0" y="0"/>
+          <a:ext cx="0" cy="0"/>
+          <a:chOff x="0" y="0"/>
+          <a:chExt cx="0" cy="0"/>
+        </a:xfrm>
+      </p:grpSpPr>
+      <p:sp>
+        <p:nvSpPr>
+          <p:cNvPr id="2" name="Title 1"/>
+          <p:cNvSpPr>
+            <a:spLocks noGrp="1"/>
+          </p:cNvSpPr>
+          <p:nvPr>
+            <p:ph type="title"/>
+          </p:nvPr>
+        </p:nvSpPr>
+        <p:spPr>
+          <a:xfrm>
+            <a:off x="457200" y="1981200"/>
+            <a:ext cx="8229600" cy="1143000"/>
+          </a:xfrm>
+        </p:spPr>
+        <p:txBody>
+          <a:bodyPr/>
+          <a:lstStyle/>
+          <a:p>
+            <a:r>
+              <a:rPr lang="en-US" dirty="0" smtClean="0"/>
+              <a:t>Thank You</a:t>
+            </a:r>
+            <a:endParaRPr lang="en-US" dirty="0"/>
+          </a:p>
+        </p:txBody>
+      </p:sp>
+      <p:sp>
+        <p:nvSpPr>
+          <p:cNvPr id="4" name="Subtitle 2"/>
+          <p:cNvSpPr txBox="1">
+            <a:spLocks/>
+          </p:cNvSpPr>
+          <p:nvPr/>
+        </p:nvSpPr>
+        <p:spPr>
+          <a:xfrm>
+            <a:off x="4038600" y="4191000"/>
+            <a:ext cx="4191000" cy="1752600"/>
+          </a:xfrm>
+          <a:prstGeom prst="rect">
+            <a:avLst/>
+          </a:prstGeom>
+        </p:spPr>
+        <p:txBody>
+          <a:bodyPr vert="horz" lIns="91440" tIns="45720" rIns="91440" bIns="45720" rtlCol="0">
+            <a:normAutofit fontScale="92500" lnSpcReduction="10000"/>
+          </a:bodyPr>
+          <a:lstStyle/>
+          <a:p>
+            <a:pPr marL="342900" marR="0" lvl="0" indent="-342900" algn="r" defTabSz="914400" rtl="0" eaLnBrk="1" fontAlgn="auto" latinLnBrk="0" hangingPunct="1">
+              <a:lnSpc>
+                <a:spcPct val="100000"/>
+              </a:lnSpc>
+              <a:spcBef>
+                <a:spcPct val="20000"/>
+              </a:spcBef>
+              <a:spcAft>
+                <a:spcPts val="0"/>
+              </a:spcAft>
+              <a:buClrTx/>
+              <a:buSzTx/>
+              <a:tabLst/>
+              <a:defRPr/>
+            </a:pPr>
+            <a:r>
+              <a:rPr kumimoji="0" lang="en-US" sz="2200" b="0" i="0" u="none" strike="noStrike" kern="1200" cap="none" spc="0" normalizeH="0" baseline="0" noProof="0" dirty="0" err="1" smtClean="0">
+                <a:ln>
+                  <a:noFill/>
+                </a:ln>
+                <a:solidFill>
+                  <a:schemeClr val="tx1"/>
+                </a:solidFill>
+                <a:effectLst/>
+                <a:uLnTx/>
+                <a:uFillTx/>
+                <a:latin typeface="Cambria" pitchFamily="18" charset="0"/>
+                <a:ea typeface="+mn-ea"/>
+                <a:cs typeface="+mn-cs"/>
+              </a:rPr>
+              <a:t>Rajasekaran</a:t>
+            </a:r>
+            <a:r>
+              <a:rPr kumimoji="0" lang="en-US" sz="2200" b="0" i="0" u="none" strike="noStrike" kern="1200" cap="none" spc="0" normalizeH="0" baseline="0" noProof="0" dirty="0" smtClean="0">
+                <a:ln>
+                  <a:noFill/>
+                </a:ln>
+                <a:solidFill>
+                  <a:schemeClr val="tx1"/>
+                </a:solidFill>
+                <a:effectLst/>
+                <a:uLnTx/>
+                <a:uFillTx/>
+                <a:latin typeface="Cambria" pitchFamily="18" charset="0"/>
+                <a:ea typeface="+mn-ea"/>
+                <a:cs typeface="+mn-cs"/>
+              </a:rPr>
+              <a:t> S</a:t>
+            </a:r>
+          </a:p>
+          <a:p>
+            <a:pPr marL="342900" marR="0" lvl="0" indent="-342900" algn="r" defTabSz="914400" rtl="0" eaLnBrk="1" fontAlgn="auto" latinLnBrk="0" hangingPunct="1">
+              <a:lnSpc>
+                <a:spcPct val="100000"/>
+              </a:lnSpc>
+              <a:spcBef>
+                <a:spcPct val="20000"/>
+              </a:spcBef>
+              <a:spcAft>
+                <a:spcPts val="0"/>
+              </a:spcAft>
+              <a:buClrTx/>
+              <a:buSzTx/>
+              <a:tabLst/>
+              <a:defRPr/>
+            </a:pPr>
+            <a:r>
+              <a:rPr kumimoji="0" lang="en-US" sz="1600" b="0" i="0" u="none" strike="noStrike" kern="1200" cap="none" spc="0" normalizeH="0" baseline="0" noProof="0" dirty="0" smtClean="0">
+                <a:ln>
+                  <a:noFill/>
+                </a:ln>
+                <a:solidFill>
+                  <a:schemeClr val="tx1"/>
+                </a:solidFill>
+                <a:effectLst/>
+                <a:uLnTx/>
+                <a:uFillTx/>
+                <a:latin typeface="Cambria" pitchFamily="18" charset="0"/>
+                <a:ea typeface="+mn-ea"/>
+                <a:cs typeface="+mn-cs"/>
+              </a:rPr>
+              <a:t>Assistant Professor,</a:t>
+            </a:r>
+          </a:p>
+          <a:p>
+            <a:pPr marL="342900" marR="0" lvl="0" indent="-342900" algn="r" defTabSz="914400" rtl="0" eaLnBrk="1" fontAlgn="auto" latinLnBrk="0" hangingPunct="1">
+              <a:lnSpc>
+                <a:spcPct val="100000"/>
+              </a:lnSpc>
+              <a:spcBef>
+                <a:spcPct val="20000"/>
+              </a:spcBef>
+              <a:spcAft>
+                <a:spcPts val="0"/>
+              </a:spcAft>
+              <a:buClrTx/>
+              <a:buSzTx/>
+              <a:tabLst/>
+              <a:defRPr/>
+            </a:pPr>
+            <a:r>
+              <a:rPr kumimoji="0" lang="en-US" sz="1600" b="0" i="0" u="none" strike="noStrike" kern="1200" cap="none" spc="0" normalizeH="0" baseline="0" noProof="0" dirty="0" smtClean="0">
+                <a:ln>
+                  <a:noFill/>
+                </a:ln>
+                <a:solidFill>
+                  <a:schemeClr val="tx1"/>
+                </a:solidFill>
+                <a:effectLst/>
+                <a:uLnTx/>
+                <a:uFillTx/>
+                <a:latin typeface="Cambria" pitchFamily="18" charset="0"/>
+                <a:ea typeface="+mn-ea"/>
+                <a:cs typeface="+mn-cs"/>
+              </a:rPr>
+              <a:t>Department of Information Technology,</a:t>
+            </a:r>
+          </a:p>
+          <a:p>
+            <a:pPr marL="342900" marR="0" lvl="0" indent="-342900" algn="r" defTabSz="914400" rtl="0" eaLnBrk="1" fontAlgn="auto" latinLnBrk="0" hangingPunct="1">
+              <a:lnSpc>
+                <a:spcPct val="100000"/>
+              </a:lnSpc>
+              <a:spcBef>
+                <a:spcPct val="20000"/>
+              </a:spcBef>
+              <a:spcAft>
+                <a:spcPts val="0"/>
+              </a:spcAft>
+              <a:buClrTx/>
+              <a:buSzTx/>
+              <a:tabLst/>
+              <a:defRPr/>
+            </a:pPr>
+            <a:r>
+              <a:rPr kumimoji="0" lang="en-US" sz="1600" b="0" i="0" u="none" strike="noStrike" kern="1200" cap="none" spc="0" normalizeH="0" baseline="0" noProof="0" dirty="0" err="1" smtClean="0">
+                <a:ln>
+                  <a:noFill/>
+                </a:ln>
+                <a:solidFill>
+                  <a:schemeClr val="tx1"/>
+                </a:solidFill>
+                <a:effectLst/>
+                <a:uLnTx/>
+                <a:uFillTx/>
+                <a:latin typeface="Cambria" pitchFamily="18" charset="0"/>
+                <a:ea typeface="+mn-ea"/>
+                <a:cs typeface="+mn-cs"/>
+              </a:rPr>
+              <a:t>KGiSL</a:t>
+            </a:r>
+            <a:r>
+              <a:rPr kumimoji="0" lang="en-US" sz="1600" b="0" i="0" u="none" strike="noStrike" kern="1200" cap="none" spc="0" normalizeH="0" baseline="0" noProof="0" dirty="0" smtClean="0">
+                <a:ln>
+                  <a:noFill/>
+                </a:ln>
+                <a:solidFill>
+                  <a:schemeClr val="tx1"/>
+                </a:solidFill>
+                <a:effectLst/>
+                <a:uLnTx/>
+                <a:uFillTx/>
+                <a:latin typeface="Cambria" pitchFamily="18" charset="0"/>
+                <a:ea typeface="+mn-ea"/>
+                <a:cs typeface="+mn-cs"/>
+              </a:rPr>
+              <a:t> Institute of Technology,</a:t>
+            </a:r>
+          </a:p>
+          <a:p>
+            <a:pPr marL="342900" marR="0" lvl="0" indent="-342900" algn="r" defTabSz="914400" rtl="0" eaLnBrk="1" fontAlgn="auto" latinLnBrk="0" hangingPunct="1">
+              <a:lnSpc>
+                <a:spcPct val="100000"/>
+              </a:lnSpc>
+              <a:spcBef>
+                <a:spcPct val="20000"/>
+              </a:spcBef>
+              <a:spcAft>
+                <a:spcPts val="0"/>
+              </a:spcAft>
+              <a:buClrTx/>
+              <a:buSzTx/>
+              <a:tabLst/>
+              <a:defRPr/>
+            </a:pPr>
+            <a:r>
+              <a:rPr kumimoji="0" lang="en-US" sz="1600" b="0" i="0" u="none" strike="noStrike" kern="1200" cap="none" spc="0" normalizeH="0" baseline="0" noProof="0" dirty="0" smtClean="0">
+                <a:ln>
+                  <a:noFill/>
+                </a:ln>
+                <a:solidFill>
+                  <a:schemeClr val="tx1"/>
+                </a:solidFill>
+                <a:effectLst/>
+                <a:uLnTx/>
+                <a:uFillTx/>
+                <a:latin typeface="Cambria" pitchFamily="18" charset="0"/>
+                <a:ea typeface="+mn-ea"/>
+                <a:cs typeface="+mn-cs"/>
+              </a:rPr>
+              <a:t>email: </a:t>
+            </a:r>
+            <a:r>
+              <a:rPr kumimoji="0" lang="en-US" sz="1600" b="0" i="0" u="none" strike="noStrike" kern="1200" cap="none" spc="0" normalizeH="0" baseline="0" noProof="0" dirty="0" smtClean="0">
+                <a:ln>
+                  <a:noFill/>
+                </a:ln>
+                <a:solidFill>
+                  <a:schemeClr val="tx1"/>
+                </a:solidFill>
+                <a:effectLst/>
+                <a:uLnTx/>
+                <a:uFillTx/>
+                <a:latin typeface="Cambria" pitchFamily="18" charset="0"/>
+                <a:ea typeface="+mn-ea"/>
+                <a:cs typeface="+mn-cs"/>
+                <a:hlinkClick r:id="rId2"/>
+              </a:rPr>
+              <a:t>proffraja@gmail.com</a:t>
+            </a:r>
+            <a:endParaRPr lang="en-US" sz="1600" dirty="0" smtClean="0">
+              <a:latin typeface="Cambria" pitchFamily="18" charset="0"/>
+            </a:endParaRPr>
+          </a:p>
+          <a:p>
+            <a:pPr marL="342900" marR="0" lvl="0" indent="-342900" algn="r" defTabSz="914400" rtl="0" eaLnBrk="1" fontAlgn="auto" latinLnBrk="0" hangingPunct="1">
+              <a:lnSpc>
+                <a:spcPct val="100000"/>
+              </a:lnSpc>
+              <a:spcBef>
+                <a:spcPct val="20000"/>
+              </a:spcBef>
+              <a:spcAft>
+                <a:spcPts val="0"/>
+              </a:spcAft>
+              <a:buClrTx/>
+              <a:buSzTx/>
+              <a:tabLst/>
+              <a:defRPr/>
+            </a:pPr>
+            <a:r>
+              <a:rPr lang="en-US" sz="1600" dirty="0" err="1" smtClean="0">
+                <a:latin typeface="Cambria" pitchFamily="18" charset="0"/>
+              </a:rPr>
+              <a:t>Github:</a:t>
+            </a:r>
+            <a:r>
+              <a:rPr lang="en-US" sz="1600" dirty="0" err="1" smtClean="0">
+                <a:latin typeface="Cambria" pitchFamily="18" charset="0"/>
+                <a:hlinkClick r:id="rId3"/>
+              </a:rPr>
+              <a:t>www.github.com</a:t>
+            </a:r>
+            <a:r>
+              <a:rPr lang="en-US" sz="1600" dirty="0" smtClean="0">
+                <a:latin typeface="Cambria" pitchFamily="18" charset="0"/>
+                <a:hlinkClick r:id="rId3"/>
+              </a:rPr>
+              <a:t>/</a:t>
+            </a:r>
+            <a:r>
+              <a:rPr lang="en-US" sz="1600" dirty="0" err="1" smtClean="0">
+                <a:latin typeface="Cambria" pitchFamily="18" charset="0"/>
+                <a:hlinkClick r:id="rId3"/>
+              </a:rPr>
+              <a:t>rajasekaranap</a:t>
+            </a:r>
+            <a:endParaRPr lang="en-US" sz="1600" dirty="0" smtClean="0">
+              <a:latin typeface="Cambria" pitchFamily="18" charset="0"/>
+            </a:endParaRPr>
+          </a:p>
+          <a:p>
+            <a:pPr marL="342900" marR="0" lvl="0" indent="-342900" algn="r" defTabSz="914400" rtl="0" eaLnBrk="1" fontAlgn="auto" latinLnBrk="0" hangingPunct="1">
+              <a:lnSpc>
+                <a:spcPct val="100000"/>
+              </a:lnSpc>
+              <a:spcBef>
+                <a:spcPct val="20000"/>
+              </a:spcBef>
+              <a:spcAft>
+                <a:spcPts val="0"/>
+              </a:spcAft>
+              <a:buClrTx/>
+              <a:buSzTx/>
+              <a:tabLst/>
+              <a:defRPr/>
+            </a:pPr>
+            <a:endParaRPr lang="en-US" sz="1600" dirty="0" smtClean="0">
+              <a:latin typeface="Cambria" pitchFamily="18" charset="0"/>
+            </a:endParaRPr>
           </a:p>
         </p:txBody>
       </p:sp>
@@ -8580,16 +11556,7 @@
                 </a:solidFill>
                 <a:latin typeface="Consolas" pitchFamily="49" charset="0"/>
               </a:rPr>
-              <a:t>else </a:t>
-            </a:r>
-            <a:r>
-              <a:rPr lang="en-US" dirty="0" smtClean="0">
-                <a:solidFill>
-                  <a:srgbClr val="7030A0"/>
-                </a:solidFill>
-                <a:latin typeface="Consolas" pitchFamily="49" charset="0"/>
-              </a:rPr>
-              <a:t>if</a:t>
+              <a:t>else if</a:t>
             </a:r>
             <a:r>
               <a:rPr lang="en-US" dirty="0" smtClean="0">

</xml_diff>